<commit_message>
Rest APIs via Spring Boot Architecture
</commit_message>
<xml_diff>
--- a/Diagrams/ArchitectureDiagrams.pptx
+++ b/Diagrams/ArchitectureDiagrams.pptx
@@ -106,6 +106,22 @@
       </a:defRPr>
     </a:lvl9pPr>
   </p:defaultTextStyle>
+  <p:extLst>
+    <p:ext uri="{EFAFB233-063F-42B5-8137-9DF3F51BA10A}">
+      <p15:sldGuideLst xmlns:p15="http://schemas.microsoft.com/office/powerpoint/2012/main">
+        <p15:guide id="1" orient="horz" pos="2160">
+          <p15:clr>
+            <a:srgbClr val="A4A3A4"/>
+          </p15:clr>
+        </p15:guide>
+        <p15:guide id="2" pos="3840">
+          <p15:clr>
+            <a:srgbClr val="A4A3A4"/>
+          </p15:clr>
+        </p15:guide>
+      </p15:sldGuideLst>
+    </p:ext>
+  </p:extLst>
 </p:presentation>
 </file>
 
@@ -131,7 +147,7 @@
           <p:cNvPr id="2" name="Title 1">
             <a:extLst>
               <a:ext uri="{FF2B5EF4-FFF2-40B4-BE49-F238E27FC236}">
-                <a16:creationId xmlns:a16="http://schemas.microsoft.com/office/drawing/2014/main" xmlns="" id="{4F483481-CD8D-EC4A-A08D-0536336D64A5}"/>
+                <a16:creationId xmlns:a16="http://schemas.microsoft.com/office/drawing/2014/main" id="{4F483481-CD8D-EC4A-A08D-0536336D64A5}"/>
               </a:ext>
             </a:extLst>
           </p:cNvPr>
@@ -168,7 +184,7 @@
           <p:cNvPr id="3" name="Subtitle 2">
             <a:extLst>
               <a:ext uri="{FF2B5EF4-FFF2-40B4-BE49-F238E27FC236}">
-                <a16:creationId xmlns:a16="http://schemas.microsoft.com/office/drawing/2014/main" xmlns="" id="{2C37E7B3-5C22-6147-9A33-352A94DFEF20}"/>
+                <a16:creationId xmlns:a16="http://schemas.microsoft.com/office/drawing/2014/main" id="{2C37E7B3-5C22-6147-9A33-352A94DFEF20}"/>
               </a:ext>
             </a:extLst>
           </p:cNvPr>
@@ -238,7 +254,7 @@
           <p:cNvPr id="4" name="Date Placeholder 3">
             <a:extLst>
               <a:ext uri="{FF2B5EF4-FFF2-40B4-BE49-F238E27FC236}">
-                <a16:creationId xmlns:a16="http://schemas.microsoft.com/office/drawing/2014/main" xmlns="" id="{3A73A892-E855-5948-B489-69D4B386244A}"/>
+                <a16:creationId xmlns:a16="http://schemas.microsoft.com/office/drawing/2014/main" id="{3A73A892-E855-5948-B489-69D4B386244A}"/>
               </a:ext>
             </a:extLst>
           </p:cNvPr>
@@ -256,7 +272,7 @@
           <a:p>
             <a:fld id="{B84E6684-3A1A-5045-AE65-4263AF7F2E1B}" type="datetimeFigureOut">
               <a:rPr lang="en-US" smtClean="0"/>
-              <a:t>7/26/2018</a:t>
+              <a:t>7/27/18</a:t>
             </a:fld>
             <a:endParaRPr lang="en-US"/>
           </a:p>
@@ -267,7 +283,7 @@
           <p:cNvPr id="5" name="Footer Placeholder 4">
             <a:extLst>
               <a:ext uri="{FF2B5EF4-FFF2-40B4-BE49-F238E27FC236}">
-                <a16:creationId xmlns:a16="http://schemas.microsoft.com/office/drawing/2014/main" xmlns="" id="{6DEC2DF8-726B-C04A-9122-F9AE75DF6CDA}"/>
+                <a16:creationId xmlns:a16="http://schemas.microsoft.com/office/drawing/2014/main" id="{6DEC2DF8-726B-C04A-9122-F9AE75DF6CDA}"/>
               </a:ext>
             </a:extLst>
           </p:cNvPr>
@@ -292,7 +308,7 @@
           <p:cNvPr id="6" name="Slide Number Placeholder 5">
             <a:extLst>
               <a:ext uri="{FF2B5EF4-FFF2-40B4-BE49-F238E27FC236}">
-                <a16:creationId xmlns:a16="http://schemas.microsoft.com/office/drawing/2014/main" xmlns="" id="{451ED4C8-4044-AA4E-B7C4-032B2506FC3E}"/>
+                <a16:creationId xmlns:a16="http://schemas.microsoft.com/office/drawing/2014/main" id="{451ED4C8-4044-AA4E-B7C4-032B2506FC3E}"/>
               </a:ext>
             </a:extLst>
           </p:cNvPr>
@@ -351,7 +367,7 @@
           <p:cNvPr id="2" name="Title 1">
             <a:extLst>
               <a:ext uri="{FF2B5EF4-FFF2-40B4-BE49-F238E27FC236}">
-                <a16:creationId xmlns:a16="http://schemas.microsoft.com/office/drawing/2014/main" xmlns="" id="{466C8FD8-103D-4A49-990F-9FA0D990D101}"/>
+                <a16:creationId xmlns:a16="http://schemas.microsoft.com/office/drawing/2014/main" id="{466C8FD8-103D-4A49-990F-9FA0D990D101}"/>
               </a:ext>
             </a:extLst>
           </p:cNvPr>
@@ -379,7 +395,7 @@
           <p:cNvPr id="3" name="Vertical Text Placeholder 2">
             <a:extLst>
               <a:ext uri="{FF2B5EF4-FFF2-40B4-BE49-F238E27FC236}">
-                <a16:creationId xmlns:a16="http://schemas.microsoft.com/office/drawing/2014/main" xmlns="" id="{DE5F06FC-DE22-614F-9F43-7E7102038F39}"/>
+                <a16:creationId xmlns:a16="http://schemas.microsoft.com/office/drawing/2014/main" id="{DE5F06FC-DE22-614F-9F43-7E7102038F39}"/>
               </a:ext>
             </a:extLst>
           </p:cNvPr>
@@ -436,7 +452,7 @@
           <p:cNvPr id="4" name="Date Placeholder 3">
             <a:extLst>
               <a:ext uri="{FF2B5EF4-FFF2-40B4-BE49-F238E27FC236}">
-                <a16:creationId xmlns:a16="http://schemas.microsoft.com/office/drawing/2014/main" xmlns="" id="{943B219F-092F-9D43-B4DF-A794CED86C8E}"/>
+                <a16:creationId xmlns:a16="http://schemas.microsoft.com/office/drawing/2014/main" id="{943B219F-092F-9D43-B4DF-A794CED86C8E}"/>
               </a:ext>
             </a:extLst>
           </p:cNvPr>
@@ -454,7 +470,7 @@
           <a:p>
             <a:fld id="{B84E6684-3A1A-5045-AE65-4263AF7F2E1B}" type="datetimeFigureOut">
               <a:rPr lang="en-US" smtClean="0"/>
-              <a:t>7/26/2018</a:t>
+              <a:t>7/27/18</a:t>
             </a:fld>
             <a:endParaRPr lang="en-US"/>
           </a:p>
@@ -465,7 +481,7 @@
           <p:cNvPr id="5" name="Footer Placeholder 4">
             <a:extLst>
               <a:ext uri="{FF2B5EF4-FFF2-40B4-BE49-F238E27FC236}">
-                <a16:creationId xmlns:a16="http://schemas.microsoft.com/office/drawing/2014/main" xmlns="" id="{2C9053F2-CC87-604A-974A-E37CE5D4E2E0}"/>
+                <a16:creationId xmlns:a16="http://schemas.microsoft.com/office/drawing/2014/main" id="{2C9053F2-CC87-604A-974A-E37CE5D4E2E0}"/>
               </a:ext>
             </a:extLst>
           </p:cNvPr>
@@ -490,7 +506,7 @@
           <p:cNvPr id="6" name="Slide Number Placeholder 5">
             <a:extLst>
               <a:ext uri="{FF2B5EF4-FFF2-40B4-BE49-F238E27FC236}">
-                <a16:creationId xmlns:a16="http://schemas.microsoft.com/office/drawing/2014/main" xmlns="" id="{47941CC6-64AE-3749-BF64-9A13ECB73040}"/>
+                <a16:creationId xmlns:a16="http://schemas.microsoft.com/office/drawing/2014/main" id="{47941CC6-64AE-3749-BF64-9A13ECB73040}"/>
               </a:ext>
             </a:extLst>
           </p:cNvPr>
@@ -549,7 +565,7 @@
           <p:cNvPr id="2" name="Vertical Title 1">
             <a:extLst>
               <a:ext uri="{FF2B5EF4-FFF2-40B4-BE49-F238E27FC236}">
-                <a16:creationId xmlns:a16="http://schemas.microsoft.com/office/drawing/2014/main" xmlns="" id="{BE5655EE-33FD-FE4A-AF1F-378EC8E367E7}"/>
+                <a16:creationId xmlns:a16="http://schemas.microsoft.com/office/drawing/2014/main" id="{BE5655EE-33FD-FE4A-AF1F-378EC8E367E7}"/>
               </a:ext>
             </a:extLst>
           </p:cNvPr>
@@ -582,7 +598,7 @@
           <p:cNvPr id="3" name="Vertical Text Placeholder 2">
             <a:extLst>
               <a:ext uri="{FF2B5EF4-FFF2-40B4-BE49-F238E27FC236}">
-                <a16:creationId xmlns:a16="http://schemas.microsoft.com/office/drawing/2014/main" xmlns="" id="{C547705A-2E90-1E4A-A022-785D5D6B0172}"/>
+                <a16:creationId xmlns:a16="http://schemas.microsoft.com/office/drawing/2014/main" id="{C547705A-2E90-1E4A-A022-785D5D6B0172}"/>
               </a:ext>
             </a:extLst>
           </p:cNvPr>
@@ -644,7 +660,7 @@
           <p:cNvPr id="4" name="Date Placeholder 3">
             <a:extLst>
               <a:ext uri="{FF2B5EF4-FFF2-40B4-BE49-F238E27FC236}">
-                <a16:creationId xmlns:a16="http://schemas.microsoft.com/office/drawing/2014/main" xmlns="" id="{CDFFB101-710D-474D-A3B4-B8D6326E4463}"/>
+                <a16:creationId xmlns:a16="http://schemas.microsoft.com/office/drawing/2014/main" id="{CDFFB101-710D-474D-A3B4-B8D6326E4463}"/>
               </a:ext>
             </a:extLst>
           </p:cNvPr>
@@ -662,7 +678,7 @@
           <a:p>
             <a:fld id="{B84E6684-3A1A-5045-AE65-4263AF7F2E1B}" type="datetimeFigureOut">
               <a:rPr lang="en-US" smtClean="0"/>
-              <a:t>7/26/2018</a:t>
+              <a:t>7/27/18</a:t>
             </a:fld>
             <a:endParaRPr lang="en-US"/>
           </a:p>
@@ -673,7 +689,7 @@
           <p:cNvPr id="5" name="Footer Placeholder 4">
             <a:extLst>
               <a:ext uri="{FF2B5EF4-FFF2-40B4-BE49-F238E27FC236}">
-                <a16:creationId xmlns:a16="http://schemas.microsoft.com/office/drawing/2014/main" xmlns="" id="{F4FDDF03-745E-374C-BD65-4472AEA0CB19}"/>
+                <a16:creationId xmlns:a16="http://schemas.microsoft.com/office/drawing/2014/main" id="{F4FDDF03-745E-374C-BD65-4472AEA0CB19}"/>
               </a:ext>
             </a:extLst>
           </p:cNvPr>
@@ -698,7 +714,7 @@
           <p:cNvPr id="6" name="Slide Number Placeholder 5">
             <a:extLst>
               <a:ext uri="{FF2B5EF4-FFF2-40B4-BE49-F238E27FC236}">
-                <a16:creationId xmlns:a16="http://schemas.microsoft.com/office/drawing/2014/main" xmlns="" id="{9257A1B5-D8AB-6D40-8FBE-396C51996A45}"/>
+                <a16:creationId xmlns:a16="http://schemas.microsoft.com/office/drawing/2014/main" id="{9257A1B5-D8AB-6D40-8FBE-396C51996A45}"/>
               </a:ext>
             </a:extLst>
           </p:cNvPr>
@@ -757,7 +773,7 @@
           <p:cNvPr id="2" name="Title 1">
             <a:extLst>
               <a:ext uri="{FF2B5EF4-FFF2-40B4-BE49-F238E27FC236}">
-                <a16:creationId xmlns:a16="http://schemas.microsoft.com/office/drawing/2014/main" xmlns="" id="{9E2735A9-92FE-6C4E-A9FA-9558ACCA3E2F}"/>
+                <a16:creationId xmlns:a16="http://schemas.microsoft.com/office/drawing/2014/main" id="{9E2735A9-92FE-6C4E-A9FA-9558ACCA3E2F}"/>
               </a:ext>
             </a:extLst>
           </p:cNvPr>
@@ -785,7 +801,7 @@
           <p:cNvPr id="3" name="Content Placeholder 2">
             <a:extLst>
               <a:ext uri="{FF2B5EF4-FFF2-40B4-BE49-F238E27FC236}">
-                <a16:creationId xmlns:a16="http://schemas.microsoft.com/office/drawing/2014/main" xmlns="" id="{C1E0F5B6-0FE5-FD4C-8F87-27C8C7B6D0D0}"/>
+                <a16:creationId xmlns:a16="http://schemas.microsoft.com/office/drawing/2014/main" id="{C1E0F5B6-0FE5-FD4C-8F87-27C8C7B6D0D0}"/>
               </a:ext>
             </a:extLst>
           </p:cNvPr>
@@ -842,7 +858,7 @@
           <p:cNvPr id="4" name="Date Placeholder 3">
             <a:extLst>
               <a:ext uri="{FF2B5EF4-FFF2-40B4-BE49-F238E27FC236}">
-                <a16:creationId xmlns:a16="http://schemas.microsoft.com/office/drawing/2014/main" xmlns="" id="{55A4DC42-BD9B-6841-A076-DB29968ED71A}"/>
+                <a16:creationId xmlns:a16="http://schemas.microsoft.com/office/drawing/2014/main" id="{55A4DC42-BD9B-6841-A076-DB29968ED71A}"/>
               </a:ext>
             </a:extLst>
           </p:cNvPr>
@@ -860,7 +876,7 @@
           <a:p>
             <a:fld id="{B84E6684-3A1A-5045-AE65-4263AF7F2E1B}" type="datetimeFigureOut">
               <a:rPr lang="en-US" smtClean="0"/>
-              <a:t>7/26/2018</a:t>
+              <a:t>7/27/18</a:t>
             </a:fld>
             <a:endParaRPr lang="en-US"/>
           </a:p>
@@ -871,7 +887,7 @@
           <p:cNvPr id="5" name="Footer Placeholder 4">
             <a:extLst>
               <a:ext uri="{FF2B5EF4-FFF2-40B4-BE49-F238E27FC236}">
-                <a16:creationId xmlns:a16="http://schemas.microsoft.com/office/drawing/2014/main" xmlns="" id="{8804E7B0-AB06-514E-955A-D2C4CA367704}"/>
+                <a16:creationId xmlns:a16="http://schemas.microsoft.com/office/drawing/2014/main" id="{8804E7B0-AB06-514E-955A-D2C4CA367704}"/>
               </a:ext>
             </a:extLst>
           </p:cNvPr>
@@ -896,7 +912,7 @@
           <p:cNvPr id="6" name="Slide Number Placeholder 5">
             <a:extLst>
               <a:ext uri="{FF2B5EF4-FFF2-40B4-BE49-F238E27FC236}">
-                <a16:creationId xmlns:a16="http://schemas.microsoft.com/office/drawing/2014/main" xmlns="" id="{181F6287-359F-0C4B-8822-D02BD7622DEF}"/>
+                <a16:creationId xmlns:a16="http://schemas.microsoft.com/office/drawing/2014/main" id="{181F6287-359F-0C4B-8822-D02BD7622DEF}"/>
               </a:ext>
             </a:extLst>
           </p:cNvPr>
@@ -955,7 +971,7 @@
           <p:cNvPr id="2" name="Title 1">
             <a:extLst>
               <a:ext uri="{FF2B5EF4-FFF2-40B4-BE49-F238E27FC236}">
-                <a16:creationId xmlns:a16="http://schemas.microsoft.com/office/drawing/2014/main" xmlns="" id="{916A4D95-A158-5B46-8F34-86DF5A5A0BBE}"/>
+                <a16:creationId xmlns:a16="http://schemas.microsoft.com/office/drawing/2014/main" id="{916A4D95-A158-5B46-8F34-86DF5A5A0BBE}"/>
               </a:ext>
             </a:extLst>
           </p:cNvPr>
@@ -992,7 +1008,7 @@
           <p:cNvPr id="3" name="Text Placeholder 2">
             <a:extLst>
               <a:ext uri="{FF2B5EF4-FFF2-40B4-BE49-F238E27FC236}">
-                <a16:creationId xmlns:a16="http://schemas.microsoft.com/office/drawing/2014/main" xmlns="" id="{EC44F9BE-1521-714F-AD6D-473D5943E5CD}"/>
+                <a16:creationId xmlns:a16="http://schemas.microsoft.com/office/drawing/2014/main" id="{EC44F9BE-1521-714F-AD6D-473D5943E5CD}"/>
               </a:ext>
             </a:extLst>
           </p:cNvPr>
@@ -1117,7 +1133,7 @@
           <p:cNvPr id="4" name="Date Placeholder 3">
             <a:extLst>
               <a:ext uri="{FF2B5EF4-FFF2-40B4-BE49-F238E27FC236}">
-                <a16:creationId xmlns:a16="http://schemas.microsoft.com/office/drawing/2014/main" xmlns="" id="{F04188D1-9D18-FA4E-91D0-D88155035D11}"/>
+                <a16:creationId xmlns:a16="http://schemas.microsoft.com/office/drawing/2014/main" id="{F04188D1-9D18-FA4E-91D0-D88155035D11}"/>
               </a:ext>
             </a:extLst>
           </p:cNvPr>
@@ -1135,7 +1151,7 @@
           <a:p>
             <a:fld id="{B84E6684-3A1A-5045-AE65-4263AF7F2E1B}" type="datetimeFigureOut">
               <a:rPr lang="en-US" smtClean="0"/>
-              <a:t>7/26/2018</a:t>
+              <a:t>7/27/18</a:t>
             </a:fld>
             <a:endParaRPr lang="en-US"/>
           </a:p>
@@ -1146,7 +1162,7 @@
           <p:cNvPr id="5" name="Footer Placeholder 4">
             <a:extLst>
               <a:ext uri="{FF2B5EF4-FFF2-40B4-BE49-F238E27FC236}">
-                <a16:creationId xmlns:a16="http://schemas.microsoft.com/office/drawing/2014/main" xmlns="" id="{EC7C7760-79C4-774F-9449-89A5C5E5CC49}"/>
+                <a16:creationId xmlns:a16="http://schemas.microsoft.com/office/drawing/2014/main" id="{EC7C7760-79C4-774F-9449-89A5C5E5CC49}"/>
               </a:ext>
             </a:extLst>
           </p:cNvPr>
@@ -1171,7 +1187,7 @@
           <p:cNvPr id="6" name="Slide Number Placeholder 5">
             <a:extLst>
               <a:ext uri="{FF2B5EF4-FFF2-40B4-BE49-F238E27FC236}">
-                <a16:creationId xmlns:a16="http://schemas.microsoft.com/office/drawing/2014/main" xmlns="" id="{8AA7EF34-FADC-3A4A-B544-8EFAA6F8062C}"/>
+                <a16:creationId xmlns:a16="http://schemas.microsoft.com/office/drawing/2014/main" id="{8AA7EF34-FADC-3A4A-B544-8EFAA6F8062C}"/>
               </a:ext>
             </a:extLst>
           </p:cNvPr>
@@ -1230,7 +1246,7 @@
           <p:cNvPr id="2" name="Title 1">
             <a:extLst>
               <a:ext uri="{FF2B5EF4-FFF2-40B4-BE49-F238E27FC236}">
-                <a16:creationId xmlns:a16="http://schemas.microsoft.com/office/drawing/2014/main" xmlns="" id="{4D48B4B5-4B3D-1741-8EF8-92E505A0C1CB}"/>
+                <a16:creationId xmlns:a16="http://schemas.microsoft.com/office/drawing/2014/main" id="{4D48B4B5-4B3D-1741-8EF8-92E505A0C1CB}"/>
               </a:ext>
             </a:extLst>
           </p:cNvPr>
@@ -1258,7 +1274,7 @@
           <p:cNvPr id="3" name="Content Placeholder 2">
             <a:extLst>
               <a:ext uri="{FF2B5EF4-FFF2-40B4-BE49-F238E27FC236}">
-                <a16:creationId xmlns:a16="http://schemas.microsoft.com/office/drawing/2014/main" xmlns="" id="{4B2BFCFF-5F67-D249-8000-2DD5FA9D1ED5}"/>
+                <a16:creationId xmlns:a16="http://schemas.microsoft.com/office/drawing/2014/main" id="{4B2BFCFF-5F67-D249-8000-2DD5FA9D1ED5}"/>
               </a:ext>
             </a:extLst>
           </p:cNvPr>
@@ -1320,7 +1336,7 @@
           <p:cNvPr id="4" name="Content Placeholder 3">
             <a:extLst>
               <a:ext uri="{FF2B5EF4-FFF2-40B4-BE49-F238E27FC236}">
-                <a16:creationId xmlns:a16="http://schemas.microsoft.com/office/drawing/2014/main" xmlns="" id="{1333C15F-E0A2-BA46-A7A3-1C4F2E405976}"/>
+                <a16:creationId xmlns:a16="http://schemas.microsoft.com/office/drawing/2014/main" id="{1333C15F-E0A2-BA46-A7A3-1C4F2E405976}"/>
               </a:ext>
             </a:extLst>
           </p:cNvPr>
@@ -1382,7 +1398,7 @@
           <p:cNvPr id="5" name="Date Placeholder 4">
             <a:extLst>
               <a:ext uri="{FF2B5EF4-FFF2-40B4-BE49-F238E27FC236}">
-                <a16:creationId xmlns:a16="http://schemas.microsoft.com/office/drawing/2014/main" xmlns="" id="{5047A732-D14D-F94E-8D87-0F4C13E1FFDB}"/>
+                <a16:creationId xmlns:a16="http://schemas.microsoft.com/office/drawing/2014/main" id="{5047A732-D14D-F94E-8D87-0F4C13E1FFDB}"/>
               </a:ext>
             </a:extLst>
           </p:cNvPr>
@@ -1400,7 +1416,7 @@
           <a:p>
             <a:fld id="{B84E6684-3A1A-5045-AE65-4263AF7F2E1B}" type="datetimeFigureOut">
               <a:rPr lang="en-US" smtClean="0"/>
-              <a:t>7/26/2018</a:t>
+              <a:t>7/27/18</a:t>
             </a:fld>
             <a:endParaRPr lang="en-US"/>
           </a:p>
@@ -1411,7 +1427,7 @@
           <p:cNvPr id="6" name="Footer Placeholder 5">
             <a:extLst>
               <a:ext uri="{FF2B5EF4-FFF2-40B4-BE49-F238E27FC236}">
-                <a16:creationId xmlns:a16="http://schemas.microsoft.com/office/drawing/2014/main" xmlns="" id="{C4D77704-AB48-4949-96C6-DFDADBE7AF67}"/>
+                <a16:creationId xmlns:a16="http://schemas.microsoft.com/office/drawing/2014/main" id="{C4D77704-AB48-4949-96C6-DFDADBE7AF67}"/>
               </a:ext>
             </a:extLst>
           </p:cNvPr>
@@ -1436,7 +1452,7 @@
           <p:cNvPr id="7" name="Slide Number Placeholder 6">
             <a:extLst>
               <a:ext uri="{FF2B5EF4-FFF2-40B4-BE49-F238E27FC236}">
-                <a16:creationId xmlns:a16="http://schemas.microsoft.com/office/drawing/2014/main" xmlns="" id="{DDE89ACE-F9F9-D242-8FF4-869061EF8AB8}"/>
+                <a16:creationId xmlns:a16="http://schemas.microsoft.com/office/drawing/2014/main" id="{DDE89ACE-F9F9-D242-8FF4-869061EF8AB8}"/>
               </a:ext>
             </a:extLst>
           </p:cNvPr>
@@ -1495,7 +1511,7 @@
           <p:cNvPr id="2" name="Title 1">
             <a:extLst>
               <a:ext uri="{FF2B5EF4-FFF2-40B4-BE49-F238E27FC236}">
-                <a16:creationId xmlns:a16="http://schemas.microsoft.com/office/drawing/2014/main" xmlns="" id="{08C6A06C-1EAE-2B44-BC33-D1CB94AA3EF8}"/>
+                <a16:creationId xmlns:a16="http://schemas.microsoft.com/office/drawing/2014/main" id="{08C6A06C-1EAE-2B44-BC33-D1CB94AA3EF8}"/>
               </a:ext>
             </a:extLst>
           </p:cNvPr>
@@ -1528,7 +1544,7 @@
           <p:cNvPr id="3" name="Text Placeholder 2">
             <a:extLst>
               <a:ext uri="{FF2B5EF4-FFF2-40B4-BE49-F238E27FC236}">
-                <a16:creationId xmlns:a16="http://schemas.microsoft.com/office/drawing/2014/main" xmlns="" id="{669E47C8-D950-F148-9DE1-1D81AA2BE8E3}"/>
+                <a16:creationId xmlns:a16="http://schemas.microsoft.com/office/drawing/2014/main" id="{669E47C8-D950-F148-9DE1-1D81AA2BE8E3}"/>
               </a:ext>
             </a:extLst>
           </p:cNvPr>
@@ -1599,7 +1615,7 @@
           <p:cNvPr id="4" name="Content Placeholder 3">
             <a:extLst>
               <a:ext uri="{FF2B5EF4-FFF2-40B4-BE49-F238E27FC236}">
-                <a16:creationId xmlns:a16="http://schemas.microsoft.com/office/drawing/2014/main" xmlns="" id="{E65EE93F-76A7-574A-8CE2-D55DD9E3C3BC}"/>
+                <a16:creationId xmlns:a16="http://schemas.microsoft.com/office/drawing/2014/main" id="{E65EE93F-76A7-574A-8CE2-D55DD9E3C3BC}"/>
               </a:ext>
             </a:extLst>
           </p:cNvPr>
@@ -1661,7 +1677,7 @@
           <p:cNvPr id="5" name="Text Placeholder 4">
             <a:extLst>
               <a:ext uri="{FF2B5EF4-FFF2-40B4-BE49-F238E27FC236}">
-                <a16:creationId xmlns:a16="http://schemas.microsoft.com/office/drawing/2014/main" xmlns="" id="{CD1F0BF1-0B0B-5D4F-B849-77FCDA81E3E8}"/>
+                <a16:creationId xmlns:a16="http://schemas.microsoft.com/office/drawing/2014/main" id="{CD1F0BF1-0B0B-5D4F-B849-77FCDA81E3E8}"/>
               </a:ext>
             </a:extLst>
           </p:cNvPr>
@@ -1732,7 +1748,7 @@
           <p:cNvPr id="6" name="Content Placeholder 5">
             <a:extLst>
               <a:ext uri="{FF2B5EF4-FFF2-40B4-BE49-F238E27FC236}">
-                <a16:creationId xmlns:a16="http://schemas.microsoft.com/office/drawing/2014/main" xmlns="" id="{339A3C1F-762D-1545-B649-3F7C35715190}"/>
+                <a16:creationId xmlns:a16="http://schemas.microsoft.com/office/drawing/2014/main" id="{339A3C1F-762D-1545-B649-3F7C35715190}"/>
               </a:ext>
             </a:extLst>
           </p:cNvPr>
@@ -1794,7 +1810,7 @@
           <p:cNvPr id="7" name="Date Placeholder 6">
             <a:extLst>
               <a:ext uri="{FF2B5EF4-FFF2-40B4-BE49-F238E27FC236}">
-                <a16:creationId xmlns:a16="http://schemas.microsoft.com/office/drawing/2014/main" xmlns="" id="{E7232A36-C465-DF49-97D1-65F9B79D7A8E}"/>
+                <a16:creationId xmlns:a16="http://schemas.microsoft.com/office/drawing/2014/main" id="{E7232A36-C465-DF49-97D1-65F9B79D7A8E}"/>
               </a:ext>
             </a:extLst>
           </p:cNvPr>
@@ -1812,7 +1828,7 @@
           <a:p>
             <a:fld id="{B84E6684-3A1A-5045-AE65-4263AF7F2E1B}" type="datetimeFigureOut">
               <a:rPr lang="en-US" smtClean="0"/>
-              <a:t>7/26/2018</a:t>
+              <a:t>7/27/18</a:t>
             </a:fld>
             <a:endParaRPr lang="en-US"/>
           </a:p>
@@ -1823,7 +1839,7 @@
           <p:cNvPr id="8" name="Footer Placeholder 7">
             <a:extLst>
               <a:ext uri="{FF2B5EF4-FFF2-40B4-BE49-F238E27FC236}">
-                <a16:creationId xmlns:a16="http://schemas.microsoft.com/office/drawing/2014/main" xmlns="" id="{3669913E-9C1D-AB45-9D6B-23544E628C55}"/>
+                <a16:creationId xmlns:a16="http://schemas.microsoft.com/office/drawing/2014/main" id="{3669913E-9C1D-AB45-9D6B-23544E628C55}"/>
               </a:ext>
             </a:extLst>
           </p:cNvPr>
@@ -1848,7 +1864,7 @@
           <p:cNvPr id="9" name="Slide Number Placeholder 8">
             <a:extLst>
               <a:ext uri="{FF2B5EF4-FFF2-40B4-BE49-F238E27FC236}">
-                <a16:creationId xmlns:a16="http://schemas.microsoft.com/office/drawing/2014/main" xmlns="" id="{C1A56BE9-2548-6647-9569-9FD22DB0D279}"/>
+                <a16:creationId xmlns:a16="http://schemas.microsoft.com/office/drawing/2014/main" id="{C1A56BE9-2548-6647-9569-9FD22DB0D279}"/>
               </a:ext>
             </a:extLst>
           </p:cNvPr>
@@ -1907,7 +1923,7 @@
           <p:cNvPr id="2" name="Title 1">
             <a:extLst>
               <a:ext uri="{FF2B5EF4-FFF2-40B4-BE49-F238E27FC236}">
-                <a16:creationId xmlns:a16="http://schemas.microsoft.com/office/drawing/2014/main" xmlns="" id="{F2E1B408-CFE9-8E4C-BB8A-78D84D1F1BB0}"/>
+                <a16:creationId xmlns:a16="http://schemas.microsoft.com/office/drawing/2014/main" id="{F2E1B408-CFE9-8E4C-BB8A-78D84D1F1BB0}"/>
               </a:ext>
             </a:extLst>
           </p:cNvPr>
@@ -1935,7 +1951,7 @@
           <p:cNvPr id="3" name="Date Placeholder 2">
             <a:extLst>
               <a:ext uri="{FF2B5EF4-FFF2-40B4-BE49-F238E27FC236}">
-                <a16:creationId xmlns:a16="http://schemas.microsoft.com/office/drawing/2014/main" xmlns="" id="{65555AC7-B56C-6D42-BC21-E3DFDF6C8895}"/>
+                <a16:creationId xmlns:a16="http://schemas.microsoft.com/office/drawing/2014/main" id="{65555AC7-B56C-6D42-BC21-E3DFDF6C8895}"/>
               </a:ext>
             </a:extLst>
           </p:cNvPr>
@@ -1953,7 +1969,7 @@
           <a:p>
             <a:fld id="{B84E6684-3A1A-5045-AE65-4263AF7F2E1B}" type="datetimeFigureOut">
               <a:rPr lang="en-US" smtClean="0"/>
-              <a:t>7/26/2018</a:t>
+              <a:t>7/27/18</a:t>
             </a:fld>
             <a:endParaRPr lang="en-US"/>
           </a:p>
@@ -1964,7 +1980,7 @@
           <p:cNvPr id="4" name="Footer Placeholder 3">
             <a:extLst>
               <a:ext uri="{FF2B5EF4-FFF2-40B4-BE49-F238E27FC236}">
-                <a16:creationId xmlns:a16="http://schemas.microsoft.com/office/drawing/2014/main" xmlns="" id="{CC85491B-7AF3-BE44-BAB1-1D7F7606C9AC}"/>
+                <a16:creationId xmlns:a16="http://schemas.microsoft.com/office/drawing/2014/main" id="{CC85491B-7AF3-BE44-BAB1-1D7F7606C9AC}"/>
               </a:ext>
             </a:extLst>
           </p:cNvPr>
@@ -1989,7 +2005,7 @@
           <p:cNvPr id="5" name="Slide Number Placeholder 4">
             <a:extLst>
               <a:ext uri="{FF2B5EF4-FFF2-40B4-BE49-F238E27FC236}">
-                <a16:creationId xmlns:a16="http://schemas.microsoft.com/office/drawing/2014/main" xmlns="" id="{113C1E14-C104-1446-9692-F03BCF3808BE}"/>
+                <a16:creationId xmlns:a16="http://schemas.microsoft.com/office/drawing/2014/main" id="{113C1E14-C104-1446-9692-F03BCF3808BE}"/>
               </a:ext>
             </a:extLst>
           </p:cNvPr>
@@ -2048,7 +2064,7 @@
           <p:cNvPr id="2" name="Date Placeholder 1">
             <a:extLst>
               <a:ext uri="{FF2B5EF4-FFF2-40B4-BE49-F238E27FC236}">
-                <a16:creationId xmlns:a16="http://schemas.microsoft.com/office/drawing/2014/main" xmlns="" id="{3F1D9452-6EFC-BE48-9D6C-5CDB254DCA92}"/>
+                <a16:creationId xmlns:a16="http://schemas.microsoft.com/office/drawing/2014/main" id="{3F1D9452-6EFC-BE48-9D6C-5CDB254DCA92}"/>
               </a:ext>
             </a:extLst>
           </p:cNvPr>
@@ -2066,7 +2082,7 @@
           <a:p>
             <a:fld id="{B84E6684-3A1A-5045-AE65-4263AF7F2E1B}" type="datetimeFigureOut">
               <a:rPr lang="en-US" smtClean="0"/>
-              <a:t>7/26/2018</a:t>
+              <a:t>7/27/18</a:t>
             </a:fld>
             <a:endParaRPr lang="en-US"/>
           </a:p>
@@ -2077,7 +2093,7 @@
           <p:cNvPr id="3" name="Footer Placeholder 2">
             <a:extLst>
               <a:ext uri="{FF2B5EF4-FFF2-40B4-BE49-F238E27FC236}">
-                <a16:creationId xmlns:a16="http://schemas.microsoft.com/office/drawing/2014/main" xmlns="" id="{1DBF7673-BD9D-E34F-9D14-E60365F243C3}"/>
+                <a16:creationId xmlns:a16="http://schemas.microsoft.com/office/drawing/2014/main" id="{1DBF7673-BD9D-E34F-9D14-E60365F243C3}"/>
               </a:ext>
             </a:extLst>
           </p:cNvPr>
@@ -2102,7 +2118,7 @@
           <p:cNvPr id="4" name="Slide Number Placeholder 3">
             <a:extLst>
               <a:ext uri="{FF2B5EF4-FFF2-40B4-BE49-F238E27FC236}">
-                <a16:creationId xmlns:a16="http://schemas.microsoft.com/office/drawing/2014/main" xmlns="" id="{A7245A1E-1607-F34D-A756-9D586DA7F689}"/>
+                <a16:creationId xmlns:a16="http://schemas.microsoft.com/office/drawing/2014/main" id="{A7245A1E-1607-F34D-A756-9D586DA7F689}"/>
               </a:ext>
             </a:extLst>
           </p:cNvPr>
@@ -2161,7 +2177,7 @@
           <p:cNvPr id="2" name="Title 1">
             <a:extLst>
               <a:ext uri="{FF2B5EF4-FFF2-40B4-BE49-F238E27FC236}">
-                <a16:creationId xmlns:a16="http://schemas.microsoft.com/office/drawing/2014/main" xmlns="" id="{1391EC19-16C8-8245-899F-0AE6B5B7376C}"/>
+                <a16:creationId xmlns:a16="http://schemas.microsoft.com/office/drawing/2014/main" id="{1391EC19-16C8-8245-899F-0AE6B5B7376C}"/>
               </a:ext>
             </a:extLst>
           </p:cNvPr>
@@ -2198,7 +2214,7 @@
           <p:cNvPr id="3" name="Content Placeholder 2">
             <a:extLst>
               <a:ext uri="{FF2B5EF4-FFF2-40B4-BE49-F238E27FC236}">
-                <a16:creationId xmlns:a16="http://schemas.microsoft.com/office/drawing/2014/main" xmlns="" id="{9150E637-085C-F341-A0D4-4A091BC21C0C}"/>
+                <a16:creationId xmlns:a16="http://schemas.microsoft.com/office/drawing/2014/main" id="{9150E637-085C-F341-A0D4-4A091BC21C0C}"/>
               </a:ext>
             </a:extLst>
           </p:cNvPr>
@@ -2288,7 +2304,7 @@
           <p:cNvPr id="4" name="Text Placeholder 3">
             <a:extLst>
               <a:ext uri="{FF2B5EF4-FFF2-40B4-BE49-F238E27FC236}">
-                <a16:creationId xmlns:a16="http://schemas.microsoft.com/office/drawing/2014/main" xmlns="" id="{AEB418CD-AF10-E04B-9779-B6EBC79AE006}"/>
+                <a16:creationId xmlns:a16="http://schemas.microsoft.com/office/drawing/2014/main" id="{AEB418CD-AF10-E04B-9779-B6EBC79AE006}"/>
               </a:ext>
             </a:extLst>
           </p:cNvPr>
@@ -2359,7 +2375,7 @@
           <p:cNvPr id="5" name="Date Placeholder 4">
             <a:extLst>
               <a:ext uri="{FF2B5EF4-FFF2-40B4-BE49-F238E27FC236}">
-                <a16:creationId xmlns:a16="http://schemas.microsoft.com/office/drawing/2014/main" xmlns="" id="{5046AFF2-A51E-834A-B342-1A745C6E21FB}"/>
+                <a16:creationId xmlns:a16="http://schemas.microsoft.com/office/drawing/2014/main" id="{5046AFF2-A51E-834A-B342-1A745C6E21FB}"/>
               </a:ext>
             </a:extLst>
           </p:cNvPr>
@@ -2377,7 +2393,7 @@
           <a:p>
             <a:fld id="{B84E6684-3A1A-5045-AE65-4263AF7F2E1B}" type="datetimeFigureOut">
               <a:rPr lang="en-US" smtClean="0"/>
-              <a:t>7/26/2018</a:t>
+              <a:t>7/27/18</a:t>
             </a:fld>
             <a:endParaRPr lang="en-US"/>
           </a:p>
@@ -2388,7 +2404,7 @@
           <p:cNvPr id="6" name="Footer Placeholder 5">
             <a:extLst>
               <a:ext uri="{FF2B5EF4-FFF2-40B4-BE49-F238E27FC236}">
-                <a16:creationId xmlns:a16="http://schemas.microsoft.com/office/drawing/2014/main" xmlns="" id="{FD36B37B-33CB-F547-A094-9A350B1631BF}"/>
+                <a16:creationId xmlns:a16="http://schemas.microsoft.com/office/drawing/2014/main" id="{FD36B37B-33CB-F547-A094-9A350B1631BF}"/>
               </a:ext>
             </a:extLst>
           </p:cNvPr>
@@ -2413,7 +2429,7 @@
           <p:cNvPr id="7" name="Slide Number Placeholder 6">
             <a:extLst>
               <a:ext uri="{FF2B5EF4-FFF2-40B4-BE49-F238E27FC236}">
-                <a16:creationId xmlns:a16="http://schemas.microsoft.com/office/drawing/2014/main" xmlns="" id="{7E168D29-8FF4-2343-9877-1153427EE9D7}"/>
+                <a16:creationId xmlns:a16="http://schemas.microsoft.com/office/drawing/2014/main" id="{7E168D29-8FF4-2343-9877-1153427EE9D7}"/>
               </a:ext>
             </a:extLst>
           </p:cNvPr>
@@ -2472,7 +2488,7 @@
           <p:cNvPr id="2" name="Title 1">
             <a:extLst>
               <a:ext uri="{FF2B5EF4-FFF2-40B4-BE49-F238E27FC236}">
-                <a16:creationId xmlns:a16="http://schemas.microsoft.com/office/drawing/2014/main" xmlns="" id="{68B27982-C8F9-E846-8D19-1B40B15DCB87}"/>
+                <a16:creationId xmlns:a16="http://schemas.microsoft.com/office/drawing/2014/main" id="{68B27982-C8F9-E846-8D19-1B40B15DCB87}"/>
               </a:ext>
             </a:extLst>
           </p:cNvPr>
@@ -2509,7 +2525,7 @@
           <p:cNvPr id="3" name="Picture Placeholder 2">
             <a:extLst>
               <a:ext uri="{FF2B5EF4-FFF2-40B4-BE49-F238E27FC236}">
-                <a16:creationId xmlns:a16="http://schemas.microsoft.com/office/drawing/2014/main" xmlns="" id="{FD88302D-0C11-F243-9A19-1FB3F3012729}"/>
+                <a16:creationId xmlns:a16="http://schemas.microsoft.com/office/drawing/2014/main" id="{FD88302D-0C11-F243-9A19-1FB3F3012729}"/>
               </a:ext>
             </a:extLst>
           </p:cNvPr>
@@ -2576,7 +2592,7 @@
           <p:cNvPr id="4" name="Text Placeholder 3">
             <a:extLst>
               <a:ext uri="{FF2B5EF4-FFF2-40B4-BE49-F238E27FC236}">
-                <a16:creationId xmlns:a16="http://schemas.microsoft.com/office/drawing/2014/main" xmlns="" id="{9D2CA1C9-1A52-3643-B980-92494C65D8F9}"/>
+                <a16:creationId xmlns:a16="http://schemas.microsoft.com/office/drawing/2014/main" id="{9D2CA1C9-1A52-3643-B980-92494C65D8F9}"/>
               </a:ext>
             </a:extLst>
           </p:cNvPr>
@@ -2647,7 +2663,7 @@
           <p:cNvPr id="5" name="Date Placeholder 4">
             <a:extLst>
               <a:ext uri="{FF2B5EF4-FFF2-40B4-BE49-F238E27FC236}">
-                <a16:creationId xmlns:a16="http://schemas.microsoft.com/office/drawing/2014/main" xmlns="" id="{A9A54AC4-F81E-7D4B-9ECC-C2AE2A83D345}"/>
+                <a16:creationId xmlns:a16="http://schemas.microsoft.com/office/drawing/2014/main" id="{A9A54AC4-F81E-7D4B-9ECC-C2AE2A83D345}"/>
               </a:ext>
             </a:extLst>
           </p:cNvPr>
@@ -2665,7 +2681,7 @@
           <a:p>
             <a:fld id="{B84E6684-3A1A-5045-AE65-4263AF7F2E1B}" type="datetimeFigureOut">
               <a:rPr lang="en-US" smtClean="0"/>
-              <a:t>7/26/2018</a:t>
+              <a:t>7/27/18</a:t>
             </a:fld>
             <a:endParaRPr lang="en-US"/>
           </a:p>
@@ -2676,7 +2692,7 @@
           <p:cNvPr id="6" name="Footer Placeholder 5">
             <a:extLst>
               <a:ext uri="{FF2B5EF4-FFF2-40B4-BE49-F238E27FC236}">
-                <a16:creationId xmlns:a16="http://schemas.microsoft.com/office/drawing/2014/main" xmlns="" id="{D162A484-C552-454B-B931-DF3EBF2B4AC4}"/>
+                <a16:creationId xmlns:a16="http://schemas.microsoft.com/office/drawing/2014/main" id="{D162A484-C552-454B-B931-DF3EBF2B4AC4}"/>
               </a:ext>
             </a:extLst>
           </p:cNvPr>
@@ -2701,7 +2717,7 @@
           <p:cNvPr id="7" name="Slide Number Placeholder 6">
             <a:extLst>
               <a:ext uri="{FF2B5EF4-FFF2-40B4-BE49-F238E27FC236}">
-                <a16:creationId xmlns:a16="http://schemas.microsoft.com/office/drawing/2014/main" xmlns="" id="{6D268146-2C79-A743-88EE-A573F12B1C8C}"/>
+                <a16:creationId xmlns:a16="http://schemas.microsoft.com/office/drawing/2014/main" id="{6D268146-2C79-A743-88EE-A573F12B1C8C}"/>
               </a:ext>
             </a:extLst>
           </p:cNvPr>
@@ -2765,7 +2781,7 @@
           <p:cNvPr id="2" name="Title Placeholder 1">
             <a:extLst>
               <a:ext uri="{FF2B5EF4-FFF2-40B4-BE49-F238E27FC236}">
-                <a16:creationId xmlns:a16="http://schemas.microsoft.com/office/drawing/2014/main" xmlns="" id="{B4843982-FF4B-FC44-B49B-C31C056F0C39}"/>
+                <a16:creationId xmlns:a16="http://schemas.microsoft.com/office/drawing/2014/main" id="{B4843982-FF4B-FC44-B49B-C31C056F0C39}"/>
               </a:ext>
             </a:extLst>
           </p:cNvPr>
@@ -2803,7 +2819,7 @@
           <p:cNvPr id="3" name="Text Placeholder 2">
             <a:extLst>
               <a:ext uri="{FF2B5EF4-FFF2-40B4-BE49-F238E27FC236}">
-                <a16:creationId xmlns:a16="http://schemas.microsoft.com/office/drawing/2014/main" xmlns="" id="{33589AE2-D37A-2E44-9BC4-A47C49DE8581}"/>
+                <a16:creationId xmlns:a16="http://schemas.microsoft.com/office/drawing/2014/main" id="{33589AE2-D37A-2E44-9BC4-A47C49DE8581}"/>
               </a:ext>
             </a:extLst>
           </p:cNvPr>
@@ -2870,7 +2886,7 @@
           <p:cNvPr id="4" name="Date Placeholder 3">
             <a:extLst>
               <a:ext uri="{FF2B5EF4-FFF2-40B4-BE49-F238E27FC236}">
-                <a16:creationId xmlns:a16="http://schemas.microsoft.com/office/drawing/2014/main" xmlns="" id="{30E43F18-2A4F-AB4D-8829-43F11521AEF0}"/>
+                <a16:creationId xmlns:a16="http://schemas.microsoft.com/office/drawing/2014/main" id="{30E43F18-2A4F-AB4D-8829-43F11521AEF0}"/>
               </a:ext>
             </a:extLst>
           </p:cNvPr>
@@ -2906,7 +2922,7 @@
           <a:p>
             <a:fld id="{B84E6684-3A1A-5045-AE65-4263AF7F2E1B}" type="datetimeFigureOut">
               <a:rPr lang="en-US" smtClean="0"/>
-              <a:t>7/26/2018</a:t>
+              <a:t>7/27/18</a:t>
             </a:fld>
             <a:endParaRPr lang="en-US"/>
           </a:p>
@@ -2917,7 +2933,7 @@
           <p:cNvPr id="5" name="Footer Placeholder 4">
             <a:extLst>
               <a:ext uri="{FF2B5EF4-FFF2-40B4-BE49-F238E27FC236}">
-                <a16:creationId xmlns:a16="http://schemas.microsoft.com/office/drawing/2014/main" xmlns="" id="{E79D271C-0264-614C-BE85-BD8EEE168C46}"/>
+                <a16:creationId xmlns:a16="http://schemas.microsoft.com/office/drawing/2014/main" id="{E79D271C-0264-614C-BE85-BD8EEE168C46}"/>
               </a:ext>
             </a:extLst>
           </p:cNvPr>
@@ -2960,7 +2976,7 @@
           <p:cNvPr id="6" name="Slide Number Placeholder 5">
             <a:extLst>
               <a:ext uri="{FF2B5EF4-FFF2-40B4-BE49-F238E27FC236}">
-                <a16:creationId xmlns:a16="http://schemas.microsoft.com/office/drawing/2014/main" xmlns="" id="{AC3248C0-9E5F-A946-BEA4-F55D476083BB}"/>
+                <a16:creationId xmlns:a16="http://schemas.microsoft.com/office/drawing/2014/main" id="{AC3248C0-9E5F-A946-BEA4-F55D476083BB}"/>
               </a:ext>
             </a:extLst>
           </p:cNvPr>
@@ -3328,7 +3344,7 @@
           <p:cNvPr id="4" name="Rounded Rectangle 3">
             <a:extLst>
               <a:ext uri="{FF2B5EF4-FFF2-40B4-BE49-F238E27FC236}">
-                <a16:creationId xmlns:a16="http://schemas.microsoft.com/office/drawing/2014/main" xmlns="" id="{E6F0588A-11E9-1A42-959B-8CB6081B7F90}"/>
+                <a16:creationId xmlns:a16="http://schemas.microsoft.com/office/drawing/2014/main" id="{E6F0588A-11E9-1A42-959B-8CB6081B7F90}"/>
               </a:ext>
             </a:extLst>
           </p:cNvPr>
@@ -3396,7 +3412,7 @@
           <p:cNvPr id="5" name="TextBox 37">
             <a:extLst>
               <a:ext uri="{FF2B5EF4-FFF2-40B4-BE49-F238E27FC236}">
-                <a16:creationId xmlns:a16="http://schemas.microsoft.com/office/drawing/2014/main" xmlns="" id="{D54CEE9C-ED79-C541-809E-2E72FAFB16C5}"/>
+                <a16:creationId xmlns:a16="http://schemas.microsoft.com/office/drawing/2014/main" id="{D54CEE9C-ED79-C541-809E-2E72FAFB16C5}"/>
               </a:ext>
             </a:extLst>
           </p:cNvPr>
@@ -3444,7 +3460,7 @@
           <p:cNvPr id="6" name="Picture 5">
             <a:extLst>
               <a:ext uri="{FF2B5EF4-FFF2-40B4-BE49-F238E27FC236}">
-                <a16:creationId xmlns:a16="http://schemas.microsoft.com/office/drawing/2014/main" xmlns="" id="{03CACE6A-0BF7-8C4B-872B-B173B4C53834}"/>
+                <a16:creationId xmlns:a16="http://schemas.microsoft.com/office/drawing/2014/main" id="{03CACE6A-0BF7-8C4B-872B-B173B4C53834}"/>
               </a:ext>
             </a:extLst>
           </p:cNvPr>
@@ -3480,7 +3496,7 @@
           <p:cNvPr id="7" name="Picture 6">
             <a:extLst>
               <a:ext uri="{FF2B5EF4-FFF2-40B4-BE49-F238E27FC236}">
-                <a16:creationId xmlns:a16="http://schemas.microsoft.com/office/drawing/2014/main" xmlns="" id="{0623E975-B362-B04C-B778-5A892F35E16A}"/>
+                <a16:creationId xmlns:a16="http://schemas.microsoft.com/office/drawing/2014/main" id="{0623E975-B362-B04C-B778-5A892F35E16A}"/>
               </a:ext>
             </a:extLst>
           </p:cNvPr>
@@ -3516,7 +3532,7 @@
           <p:cNvPr id="8" name="TextBox 7">
             <a:extLst>
               <a:ext uri="{FF2B5EF4-FFF2-40B4-BE49-F238E27FC236}">
-                <a16:creationId xmlns:a16="http://schemas.microsoft.com/office/drawing/2014/main" xmlns="" id="{47EC6D32-FF11-8948-8DF3-9DEB767E1BC2}"/>
+                <a16:creationId xmlns:a16="http://schemas.microsoft.com/office/drawing/2014/main" id="{47EC6D32-FF11-8948-8DF3-9DEB767E1BC2}"/>
               </a:ext>
             </a:extLst>
           </p:cNvPr>
@@ -3555,7 +3571,7 @@
           <p:cNvPr id="9" name="Rounded Rectangle 8">
             <a:extLst>
               <a:ext uri="{FF2B5EF4-FFF2-40B4-BE49-F238E27FC236}">
-                <a16:creationId xmlns:a16="http://schemas.microsoft.com/office/drawing/2014/main" xmlns="" id="{E228E945-E3BD-964E-9257-2B28C5D8B625}"/>
+                <a16:creationId xmlns:a16="http://schemas.microsoft.com/office/drawing/2014/main" id="{E228E945-E3BD-964E-9257-2B28C5D8B625}"/>
               </a:ext>
             </a:extLst>
           </p:cNvPr>
@@ -3623,7 +3639,7 @@
           <p:cNvPr id="10" name="Picture 9">
             <a:extLst>
               <a:ext uri="{FF2B5EF4-FFF2-40B4-BE49-F238E27FC236}">
-                <a16:creationId xmlns:a16="http://schemas.microsoft.com/office/drawing/2014/main" xmlns="" id="{6215B7A8-6B66-3046-969A-BCB18342D9C6}"/>
+                <a16:creationId xmlns:a16="http://schemas.microsoft.com/office/drawing/2014/main" id="{6215B7A8-6B66-3046-969A-BCB18342D9C6}"/>
               </a:ext>
             </a:extLst>
           </p:cNvPr>
@@ -3659,7 +3675,7 @@
           <p:cNvPr id="11" name="TextBox 10">
             <a:extLst>
               <a:ext uri="{FF2B5EF4-FFF2-40B4-BE49-F238E27FC236}">
-                <a16:creationId xmlns:a16="http://schemas.microsoft.com/office/drawing/2014/main" xmlns="" id="{AE495CD3-1D8F-8E4E-A563-76F5B319BF26}"/>
+                <a16:creationId xmlns:a16="http://schemas.microsoft.com/office/drawing/2014/main" id="{AE495CD3-1D8F-8E4E-A563-76F5B319BF26}"/>
               </a:ext>
             </a:extLst>
           </p:cNvPr>
@@ -3703,7 +3719,7 @@
           <p:cNvPr id="12" name="Picture 11">
             <a:extLst>
               <a:ext uri="{FF2B5EF4-FFF2-40B4-BE49-F238E27FC236}">
-                <a16:creationId xmlns:a16="http://schemas.microsoft.com/office/drawing/2014/main" xmlns="" id="{C3644FC1-22AF-094D-9D06-0BFD3B9DD629}"/>
+                <a16:creationId xmlns:a16="http://schemas.microsoft.com/office/drawing/2014/main" id="{C3644FC1-22AF-094D-9D06-0BFD3B9DD629}"/>
               </a:ext>
             </a:extLst>
           </p:cNvPr>
@@ -3739,7 +3755,7 @@
           <p:cNvPr id="13" name="Picture 12">
             <a:extLst>
               <a:ext uri="{FF2B5EF4-FFF2-40B4-BE49-F238E27FC236}">
-                <a16:creationId xmlns:a16="http://schemas.microsoft.com/office/drawing/2014/main" xmlns="" id="{7D5517F7-5C51-0A43-9543-4AB5A37D0CA3}"/>
+                <a16:creationId xmlns:a16="http://schemas.microsoft.com/office/drawing/2014/main" id="{7D5517F7-5C51-0A43-9543-4AB5A37D0CA3}"/>
               </a:ext>
             </a:extLst>
           </p:cNvPr>
@@ -3775,7 +3791,7 @@
           <p:cNvPr id="14" name="Picture 13">
             <a:extLst>
               <a:ext uri="{FF2B5EF4-FFF2-40B4-BE49-F238E27FC236}">
-                <a16:creationId xmlns:a16="http://schemas.microsoft.com/office/drawing/2014/main" xmlns="" id="{31AF97F6-A0F4-8247-97C0-A18615923015}"/>
+                <a16:creationId xmlns:a16="http://schemas.microsoft.com/office/drawing/2014/main" id="{31AF97F6-A0F4-8247-97C0-A18615923015}"/>
               </a:ext>
             </a:extLst>
           </p:cNvPr>
@@ -3811,7 +3827,7 @@
           <p:cNvPr id="15" name="TextBox 14">
             <a:extLst>
               <a:ext uri="{FF2B5EF4-FFF2-40B4-BE49-F238E27FC236}">
-                <a16:creationId xmlns:a16="http://schemas.microsoft.com/office/drawing/2014/main" xmlns="" id="{FBBC15D1-C202-7341-8DDF-3CD2BCCE0583}"/>
+                <a16:creationId xmlns:a16="http://schemas.microsoft.com/office/drawing/2014/main" id="{FBBC15D1-C202-7341-8DDF-3CD2BCCE0583}"/>
               </a:ext>
             </a:extLst>
           </p:cNvPr>
@@ -3847,7 +3863,7 @@
           <p:cNvPr id="16" name="TextBox 15">
             <a:extLst>
               <a:ext uri="{FF2B5EF4-FFF2-40B4-BE49-F238E27FC236}">
-                <a16:creationId xmlns:a16="http://schemas.microsoft.com/office/drawing/2014/main" xmlns="" id="{9B1B93AB-4217-DB40-8BA1-86203F16F86E}"/>
+                <a16:creationId xmlns:a16="http://schemas.microsoft.com/office/drawing/2014/main" id="{9B1B93AB-4217-DB40-8BA1-86203F16F86E}"/>
               </a:ext>
             </a:extLst>
           </p:cNvPr>
@@ -3883,7 +3899,7 @@
           <p:cNvPr id="17" name="TextBox 16">
             <a:extLst>
               <a:ext uri="{FF2B5EF4-FFF2-40B4-BE49-F238E27FC236}">
-                <a16:creationId xmlns:a16="http://schemas.microsoft.com/office/drawing/2014/main" xmlns="" id="{D309510A-5626-3343-AD68-0F337FEA94BD}"/>
+                <a16:creationId xmlns:a16="http://schemas.microsoft.com/office/drawing/2014/main" id="{D309510A-5626-3343-AD68-0F337FEA94BD}"/>
               </a:ext>
             </a:extLst>
           </p:cNvPr>
@@ -3919,7 +3935,7 @@
           <p:cNvPr id="18" name="Straight Connector 17">
             <a:extLst>
               <a:ext uri="{FF2B5EF4-FFF2-40B4-BE49-F238E27FC236}">
-                <a16:creationId xmlns:a16="http://schemas.microsoft.com/office/drawing/2014/main" xmlns="" id="{CB4EB7DF-F0AD-5142-97EA-625D5D53B17C}"/>
+                <a16:creationId xmlns:a16="http://schemas.microsoft.com/office/drawing/2014/main" id="{CB4EB7DF-F0AD-5142-97EA-625D5D53B17C}"/>
               </a:ext>
             </a:extLst>
           </p:cNvPr>
@@ -3963,7 +3979,7 @@
           <p:cNvPr id="19" name="Picture 18">
             <a:extLst>
               <a:ext uri="{FF2B5EF4-FFF2-40B4-BE49-F238E27FC236}">
-                <a16:creationId xmlns:a16="http://schemas.microsoft.com/office/drawing/2014/main" xmlns="" id="{288A0A02-8EF2-B943-9527-E1E51B69EF75}"/>
+                <a16:creationId xmlns:a16="http://schemas.microsoft.com/office/drawing/2014/main" id="{288A0A02-8EF2-B943-9527-E1E51B69EF75}"/>
               </a:ext>
             </a:extLst>
           </p:cNvPr>
@@ -3993,7 +4009,7 @@
           <p:cNvPr id="20" name="TextBox 19">
             <a:extLst>
               <a:ext uri="{FF2B5EF4-FFF2-40B4-BE49-F238E27FC236}">
-                <a16:creationId xmlns:a16="http://schemas.microsoft.com/office/drawing/2014/main" xmlns="" id="{D5BD82CC-F544-0145-8B44-0A194D911DF6}"/>
+                <a16:creationId xmlns:a16="http://schemas.microsoft.com/office/drawing/2014/main" id="{D5BD82CC-F544-0145-8B44-0A194D911DF6}"/>
               </a:ext>
             </a:extLst>
           </p:cNvPr>
@@ -4030,7 +4046,7 @@
           <p:cNvPr id="21" name="Picture 20">
             <a:extLst>
               <a:ext uri="{FF2B5EF4-FFF2-40B4-BE49-F238E27FC236}">
-                <a16:creationId xmlns:a16="http://schemas.microsoft.com/office/drawing/2014/main" xmlns="" id="{A8808742-D4E4-4641-95DF-51296DAE57C3}"/>
+                <a16:creationId xmlns:a16="http://schemas.microsoft.com/office/drawing/2014/main" id="{A8808742-D4E4-4641-95DF-51296DAE57C3}"/>
               </a:ext>
             </a:extLst>
           </p:cNvPr>
@@ -4066,7 +4082,7 @@
           <p:cNvPr id="22" name="TextBox 21">
             <a:extLst>
               <a:ext uri="{FF2B5EF4-FFF2-40B4-BE49-F238E27FC236}">
-                <a16:creationId xmlns:a16="http://schemas.microsoft.com/office/drawing/2014/main" xmlns="" id="{FD54E821-596C-7243-8E23-7F0F03356663}"/>
+                <a16:creationId xmlns:a16="http://schemas.microsoft.com/office/drawing/2014/main" id="{FD54E821-596C-7243-8E23-7F0F03356663}"/>
               </a:ext>
             </a:extLst>
           </p:cNvPr>
@@ -4108,7 +4124,7 @@
           <p:cNvPr id="23" name="Picture 22">
             <a:extLst>
               <a:ext uri="{FF2B5EF4-FFF2-40B4-BE49-F238E27FC236}">
-                <a16:creationId xmlns:a16="http://schemas.microsoft.com/office/drawing/2014/main" xmlns="" id="{9581F743-1116-9943-8A94-686BBAD73575}"/>
+                <a16:creationId xmlns:a16="http://schemas.microsoft.com/office/drawing/2014/main" id="{9581F743-1116-9943-8A94-686BBAD73575}"/>
               </a:ext>
             </a:extLst>
           </p:cNvPr>
@@ -4138,7 +4154,7 @@
           <p:cNvPr id="24" name="Straight Arrow Connector 23">
             <a:extLst>
               <a:ext uri="{FF2B5EF4-FFF2-40B4-BE49-F238E27FC236}">
-                <a16:creationId xmlns:a16="http://schemas.microsoft.com/office/drawing/2014/main" xmlns="" id="{E5CD0241-5FB9-AB47-A0E7-889087AB4A83}"/>
+                <a16:creationId xmlns:a16="http://schemas.microsoft.com/office/drawing/2014/main" id="{E5CD0241-5FB9-AB47-A0E7-889087AB4A83}"/>
               </a:ext>
             </a:extLst>
           </p:cNvPr>
@@ -4186,7 +4202,7 @@
           <p:cNvPr id="25" name="Straight Arrow Connector 24">
             <a:extLst>
               <a:ext uri="{FF2B5EF4-FFF2-40B4-BE49-F238E27FC236}">
-                <a16:creationId xmlns:a16="http://schemas.microsoft.com/office/drawing/2014/main" xmlns="" id="{8AFC7255-A020-A948-9EED-600E33357D29}"/>
+                <a16:creationId xmlns:a16="http://schemas.microsoft.com/office/drawing/2014/main" id="{8AFC7255-A020-A948-9EED-600E33357D29}"/>
               </a:ext>
             </a:extLst>
           </p:cNvPr>
@@ -4234,7 +4250,7 @@
           <p:cNvPr id="26" name="Straight Arrow Connector 25">
             <a:extLst>
               <a:ext uri="{FF2B5EF4-FFF2-40B4-BE49-F238E27FC236}">
-                <a16:creationId xmlns:a16="http://schemas.microsoft.com/office/drawing/2014/main" xmlns="" id="{11144E6E-C3DA-664C-B2DD-E5FCE1DB2ED7}"/>
+                <a16:creationId xmlns:a16="http://schemas.microsoft.com/office/drawing/2014/main" id="{11144E6E-C3DA-664C-B2DD-E5FCE1DB2ED7}"/>
               </a:ext>
             </a:extLst>
           </p:cNvPr>
@@ -4282,7 +4298,7 @@
           <p:cNvPr id="27" name="Picture 26">
             <a:extLst>
               <a:ext uri="{FF2B5EF4-FFF2-40B4-BE49-F238E27FC236}">
-                <a16:creationId xmlns:a16="http://schemas.microsoft.com/office/drawing/2014/main" xmlns="" id="{BAB7B75A-DDBB-414C-B370-003EDB684E05}"/>
+                <a16:creationId xmlns:a16="http://schemas.microsoft.com/office/drawing/2014/main" id="{BAB7B75A-DDBB-414C-B370-003EDB684E05}"/>
               </a:ext>
             </a:extLst>
           </p:cNvPr>
@@ -4318,7 +4334,7 @@
           <p:cNvPr id="28" name="Elbow Connector 27">
             <a:extLst>
               <a:ext uri="{FF2B5EF4-FFF2-40B4-BE49-F238E27FC236}">
-                <a16:creationId xmlns:a16="http://schemas.microsoft.com/office/drawing/2014/main" xmlns="" id="{1FEA0E1B-88FC-A54A-B63F-419E013B2078}"/>
+                <a16:creationId xmlns:a16="http://schemas.microsoft.com/office/drawing/2014/main" id="{1FEA0E1B-88FC-A54A-B63F-419E013B2078}"/>
               </a:ext>
             </a:extLst>
           </p:cNvPr>
@@ -4366,7 +4382,7 @@
           <p:cNvPr id="29" name="Elbow Connector 28">
             <a:extLst>
               <a:ext uri="{FF2B5EF4-FFF2-40B4-BE49-F238E27FC236}">
-                <a16:creationId xmlns:a16="http://schemas.microsoft.com/office/drawing/2014/main" xmlns="" id="{A2B4216C-1F23-F747-AAF5-A3762DF6AC82}"/>
+                <a16:creationId xmlns:a16="http://schemas.microsoft.com/office/drawing/2014/main" id="{A2B4216C-1F23-F747-AAF5-A3762DF6AC82}"/>
               </a:ext>
             </a:extLst>
           </p:cNvPr>
@@ -4413,7 +4429,7 @@
           <p:cNvPr id="30" name="Picture 29">
             <a:extLst>
               <a:ext uri="{FF2B5EF4-FFF2-40B4-BE49-F238E27FC236}">
-                <a16:creationId xmlns:a16="http://schemas.microsoft.com/office/drawing/2014/main" xmlns="" id="{6EA18257-D4AE-4848-BEF7-5AECC4247A0F}"/>
+                <a16:creationId xmlns:a16="http://schemas.microsoft.com/office/drawing/2014/main" id="{6EA18257-D4AE-4848-BEF7-5AECC4247A0F}"/>
               </a:ext>
             </a:extLst>
           </p:cNvPr>
@@ -4443,7 +4459,7 @@
           <p:cNvPr id="31" name="Picture 30">
             <a:extLst>
               <a:ext uri="{FF2B5EF4-FFF2-40B4-BE49-F238E27FC236}">
-                <a16:creationId xmlns:a16="http://schemas.microsoft.com/office/drawing/2014/main" xmlns="" id="{78A9AA5A-085B-8441-801E-262E67B02CCD}"/>
+                <a16:creationId xmlns:a16="http://schemas.microsoft.com/office/drawing/2014/main" id="{78A9AA5A-085B-8441-801E-262E67B02CCD}"/>
               </a:ext>
             </a:extLst>
           </p:cNvPr>
@@ -4479,7 +4495,7 @@
           <p:cNvPr id="32" name="TextBox 31">
             <a:extLst>
               <a:ext uri="{FF2B5EF4-FFF2-40B4-BE49-F238E27FC236}">
-                <a16:creationId xmlns:a16="http://schemas.microsoft.com/office/drawing/2014/main" xmlns="" id="{2C0030C5-3DE1-D04F-8912-3F8D8EAD1F33}"/>
+                <a16:creationId xmlns:a16="http://schemas.microsoft.com/office/drawing/2014/main" id="{2C0030C5-3DE1-D04F-8912-3F8D8EAD1F33}"/>
               </a:ext>
             </a:extLst>
           </p:cNvPr>
@@ -4515,7 +4531,7 @@
           <p:cNvPr id="33" name="Curved Connector 32">
             <a:extLst>
               <a:ext uri="{FF2B5EF4-FFF2-40B4-BE49-F238E27FC236}">
-                <a16:creationId xmlns:a16="http://schemas.microsoft.com/office/drawing/2014/main" xmlns="" id="{AD6A60D2-20D0-9848-8BE9-F3CA9EB63E6C}"/>
+                <a16:creationId xmlns:a16="http://schemas.microsoft.com/office/drawing/2014/main" id="{AD6A60D2-20D0-9848-8BE9-F3CA9EB63E6C}"/>
               </a:ext>
             </a:extLst>
           </p:cNvPr>
@@ -4564,7 +4580,7 @@
           <p:cNvPr id="34" name="Title 1">
             <a:extLst>
               <a:ext uri="{FF2B5EF4-FFF2-40B4-BE49-F238E27FC236}">
-                <a16:creationId xmlns:a16="http://schemas.microsoft.com/office/drawing/2014/main" xmlns="" id="{0FC18054-22BF-F249-AC9D-098158E05978}"/>
+                <a16:creationId xmlns:a16="http://schemas.microsoft.com/office/drawing/2014/main" id="{0FC18054-22BF-F249-AC9D-098158E05978}"/>
               </a:ext>
             </a:extLst>
           </p:cNvPr>
@@ -4648,7 +4664,7 @@
           <p:cNvPr id="4" name="Picture 3">
             <a:extLst>
               <a:ext uri="{FF2B5EF4-FFF2-40B4-BE49-F238E27FC236}">
-                <a16:creationId xmlns:a16="http://schemas.microsoft.com/office/drawing/2014/main" xmlns="" id="{191BFAD9-3E95-1148-AD87-2A14BD661552}"/>
+                <a16:creationId xmlns:a16="http://schemas.microsoft.com/office/drawing/2014/main" id="{191BFAD9-3E95-1148-AD87-2A14BD661552}"/>
               </a:ext>
             </a:extLst>
           </p:cNvPr>
@@ -4678,7 +4694,7 @@
           <p:cNvPr id="5" name="Title 1">
             <a:extLst>
               <a:ext uri="{FF2B5EF4-FFF2-40B4-BE49-F238E27FC236}">
-                <a16:creationId xmlns:a16="http://schemas.microsoft.com/office/drawing/2014/main" xmlns="" id="{F817CF2C-7B62-364B-9415-378888C2CF96}"/>
+                <a16:creationId xmlns:a16="http://schemas.microsoft.com/office/drawing/2014/main" id="{F817CF2C-7B62-364B-9415-378888C2CF96}"/>
               </a:ext>
             </a:extLst>
           </p:cNvPr>
@@ -4722,7 +4738,7 @@
           <p:cNvPr id="6" name="Straight Connector 5">
             <a:extLst>
               <a:ext uri="{FF2B5EF4-FFF2-40B4-BE49-F238E27FC236}">
-                <a16:creationId xmlns:a16="http://schemas.microsoft.com/office/drawing/2014/main" xmlns="" id="{A906EB82-8E8B-C645-A295-44A0C50B70CC}"/>
+                <a16:creationId xmlns:a16="http://schemas.microsoft.com/office/drawing/2014/main" id="{A906EB82-8E8B-C645-A295-44A0C50B70CC}"/>
               </a:ext>
             </a:extLst>
           </p:cNvPr>
@@ -4758,7 +4774,7 @@
           <p:cNvPr id="7" name="Straight Connector 6">
             <a:extLst>
               <a:ext uri="{FF2B5EF4-FFF2-40B4-BE49-F238E27FC236}">
-                <a16:creationId xmlns:a16="http://schemas.microsoft.com/office/drawing/2014/main" xmlns="" id="{A14874F9-8414-8A48-B051-E584B173DE41}"/>
+                <a16:creationId xmlns:a16="http://schemas.microsoft.com/office/drawing/2014/main" id="{A14874F9-8414-8A48-B051-E584B173DE41}"/>
               </a:ext>
             </a:extLst>
           </p:cNvPr>
@@ -4794,7 +4810,7 @@
           <p:cNvPr id="8" name="Straight Connector 7">
             <a:extLst>
               <a:ext uri="{FF2B5EF4-FFF2-40B4-BE49-F238E27FC236}">
-                <a16:creationId xmlns:a16="http://schemas.microsoft.com/office/drawing/2014/main" xmlns="" id="{F38DFBFC-BF2E-0945-8F4C-3CD1EDEFEA4C}"/>
+                <a16:creationId xmlns:a16="http://schemas.microsoft.com/office/drawing/2014/main" id="{F38DFBFC-BF2E-0945-8F4C-3CD1EDEFEA4C}"/>
               </a:ext>
             </a:extLst>
           </p:cNvPr>
@@ -4830,7 +4846,7 @@
           <p:cNvPr id="9" name="Rectangle 8">
             <a:extLst>
               <a:ext uri="{FF2B5EF4-FFF2-40B4-BE49-F238E27FC236}">
-                <a16:creationId xmlns:a16="http://schemas.microsoft.com/office/drawing/2014/main" xmlns="" id="{A5D26E06-6616-F64B-8DA4-3BF825F83FCC}"/>
+                <a16:creationId xmlns:a16="http://schemas.microsoft.com/office/drawing/2014/main" id="{A5D26E06-6616-F64B-8DA4-3BF825F83FCC}"/>
               </a:ext>
             </a:extLst>
           </p:cNvPr>
@@ -4896,7 +4912,7 @@
           <p:cNvPr id="10" name="Rectangle 9">
             <a:extLst>
               <a:ext uri="{FF2B5EF4-FFF2-40B4-BE49-F238E27FC236}">
-                <a16:creationId xmlns:a16="http://schemas.microsoft.com/office/drawing/2014/main" xmlns="" id="{E96C2AAA-B4EB-5543-AB02-73FE2FC496E8}"/>
+                <a16:creationId xmlns:a16="http://schemas.microsoft.com/office/drawing/2014/main" id="{E96C2AAA-B4EB-5543-AB02-73FE2FC496E8}"/>
               </a:ext>
             </a:extLst>
           </p:cNvPr>
@@ -4906,7 +4922,7 @@
         <p:spPr>
           <a:xfrm>
             <a:off x="3746629" y="1406749"/>
-            <a:ext cx="2133600" cy="304800"/>
+            <a:ext cx="2417628" cy="304800"/>
           </a:xfrm>
           <a:prstGeom prst="rect">
             <a:avLst/>
@@ -4952,7 +4968,7 @@
                   <a:schemeClr val="bg1"/>
                 </a:solidFill>
               </a:rPr>
-              <a:t>Controller Layer</a:t>
+              <a:t>Handles HTTP Methods</a:t>
             </a:r>
           </a:p>
         </p:txBody>
@@ -4962,7 +4978,7 @@
           <p:cNvPr id="11" name="Rectangle 10">
             <a:extLst>
               <a:ext uri="{FF2B5EF4-FFF2-40B4-BE49-F238E27FC236}">
-                <a16:creationId xmlns:a16="http://schemas.microsoft.com/office/drawing/2014/main" xmlns="" id="{90299D27-AE32-5543-AA46-4ABB23C69B38}"/>
+                <a16:creationId xmlns:a16="http://schemas.microsoft.com/office/drawing/2014/main" id="{90299D27-AE32-5543-AA46-4ABB23C69B38}"/>
               </a:ext>
             </a:extLst>
           </p:cNvPr>
@@ -5018,7 +5034,7 @@
                   <a:schemeClr val="bg1"/>
                 </a:solidFill>
               </a:rPr>
-              <a:t>Controller Layer</a:t>
+              <a:t>Service Layer</a:t>
             </a:r>
           </a:p>
         </p:txBody>
@@ -5028,7 +5044,7 @@
           <p:cNvPr id="12" name="Rectangle 11">
             <a:extLst>
               <a:ext uri="{FF2B5EF4-FFF2-40B4-BE49-F238E27FC236}">
-                <a16:creationId xmlns:a16="http://schemas.microsoft.com/office/drawing/2014/main" xmlns="" id="{0DB75002-0384-104C-99CC-13CD4EFD5E65}"/>
+                <a16:creationId xmlns:a16="http://schemas.microsoft.com/office/drawing/2014/main" id="{0DB75002-0384-104C-99CC-13CD4EFD5E65}"/>
               </a:ext>
             </a:extLst>
           </p:cNvPr>
@@ -5084,7 +5100,7 @@
                   <a:schemeClr val="bg1"/>
                 </a:solidFill>
               </a:rPr>
-              <a:t>Controller Layer</a:t>
+              <a:t>Business Logic</a:t>
             </a:r>
           </a:p>
         </p:txBody>
@@ -5094,7 +5110,7 @@
           <p:cNvPr id="13" name="Rectangle 12">
             <a:extLst>
               <a:ext uri="{FF2B5EF4-FFF2-40B4-BE49-F238E27FC236}">
-                <a16:creationId xmlns:a16="http://schemas.microsoft.com/office/drawing/2014/main" xmlns="" id="{81D09299-862C-6E46-B1FC-705EA476094A}"/>
+                <a16:creationId xmlns:a16="http://schemas.microsoft.com/office/drawing/2014/main" id="{81D09299-862C-6E46-B1FC-705EA476094A}"/>
               </a:ext>
             </a:extLst>
           </p:cNvPr>
@@ -5150,7 +5166,7 @@
                   <a:schemeClr val="bg1"/>
                 </a:solidFill>
               </a:rPr>
-              <a:t>Controller Layer</a:t>
+              <a:t>DAO Layer</a:t>
             </a:r>
           </a:p>
         </p:txBody>
@@ -5160,7 +5176,7 @@
           <p:cNvPr id="14" name="Rectangle 13">
             <a:extLst>
               <a:ext uri="{FF2B5EF4-FFF2-40B4-BE49-F238E27FC236}">
-                <a16:creationId xmlns:a16="http://schemas.microsoft.com/office/drawing/2014/main" xmlns="" id="{46770EB2-5507-D54A-8D04-61285945B573}"/>
+                <a16:creationId xmlns:a16="http://schemas.microsoft.com/office/drawing/2014/main" id="{46770EB2-5507-D54A-8D04-61285945B573}"/>
               </a:ext>
             </a:extLst>
           </p:cNvPr>
@@ -5216,7 +5232,7 @@
                   <a:schemeClr val="bg1"/>
                 </a:solidFill>
               </a:rPr>
-              <a:t>Controller Layer</a:t>
+              <a:t>Data Access</a:t>
             </a:r>
           </a:p>
         </p:txBody>
@@ -5226,7 +5242,7 @@
           <p:cNvPr id="15" name="Picture 14">
             <a:extLst>
               <a:ext uri="{FF2B5EF4-FFF2-40B4-BE49-F238E27FC236}">
-                <a16:creationId xmlns:a16="http://schemas.microsoft.com/office/drawing/2014/main" xmlns="" id="{D837FEFD-8AF9-C34D-819B-E03E05AF9B82}"/>
+                <a16:creationId xmlns:a16="http://schemas.microsoft.com/office/drawing/2014/main" id="{D837FEFD-8AF9-C34D-819B-E03E05AF9B82}"/>
               </a:ext>
             </a:extLst>
           </p:cNvPr>
@@ -5256,7 +5272,7 @@
           <p:cNvPr id="17" name="Picture 16">
             <a:extLst>
               <a:ext uri="{FF2B5EF4-FFF2-40B4-BE49-F238E27FC236}">
-                <a16:creationId xmlns:a16="http://schemas.microsoft.com/office/drawing/2014/main" xmlns="" id="{DC1FCC7F-8F23-1F4C-99F8-C13311E6115E}"/>
+                <a16:creationId xmlns:a16="http://schemas.microsoft.com/office/drawing/2014/main" id="{DC1FCC7F-8F23-1F4C-99F8-C13311E6115E}"/>
               </a:ext>
             </a:extLst>
           </p:cNvPr>
@@ -5286,7 +5302,7 @@
           <p:cNvPr id="18" name="Straight Arrow Connector 17">
             <a:extLst>
               <a:ext uri="{FF2B5EF4-FFF2-40B4-BE49-F238E27FC236}">
-                <a16:creationId xmlns:a16="http://schemas.microsoft.com/office/drawing/2014/main" xmlns="" id="{DBA13DBE-B9F1-1142-B8F2-74764B9A7870}"/>
+                <a16:creationId xmlns:a16="http://schemas.microsoft.com/office/drawing/2014/main" id="{DBA13DBE-B9F1-1142-B8F2-74764B9A7870}"/>
               </a:ext>
             </a:extLst>
           </p:cNvPr>
@@ -5326,7 +5342,7 @@
           <p:cNvPr id="19" name="Straight Arrow Connector 18">
             <a:extLst>
               <a:ext uri="{FF2B5EF4-FFF2-40B4-BE49-F238E27FC236}">
-                <a16:creationId xmlns:a16="http://schemas.microsoft.com/office/drawing/2014/main" xmlns="" id="{6DE54ED9-A44F-3942-B49C-216991B63AB6}"/>
+                <a16:creationId xmlns:a16="http://schemas.microsoft.com/office/drawing/2014/main" id="{6DE54ED9-A44F-3942-B49C-216991B63AB6}"/>
               </a:ext>
             </a:extLst>
           </p:cNvPr>
@@ -5366,7 +5382,7 @@
           <p:cNvPr id="20" name="Straight Arrow Connector 19">
             <a:extLst>
               <a:ext uri="{FF2B5EF4-FFF2-40B4-BE49-F238E27FC236}">
-                <a16:creationId xmlns:a16="http://schemas.microsoft.com/office/drawing/2014/main" xmlns="" id="{65C56B97-92A7-F747-8864-CEE1CFB80520}"/>
+                <a16:creationId xmlns:a16="http://schemas.microsoft.com/office/drawing/2014/main" id="{65C56B97-92A7-F747-8864-CEE1CFB80520}"/>
               </a:ext>
             </a:extLst>
           </p:cNvPr>
@@ -5406,7 +5422,7 @@
           <p:cNvPr id="21" name="Straight Arrow Connector 20">
             <a:extLst>
               <a:ext uri="{FF2B5EF4-FFF2-40B4-BE49-F238E27FC236}">
-                <a16:creationId xmlns:a16="http://schemas.microsoft.com/office/drawing/2014/main" xmlns="" id="{17AC3917-33C7-2544-B324-DC6EAA3192A2}"/>
+                <a16:creationId xmlns:a16="http://schemas.microsoft.com/office/drawing/2014/main" id="{17AC3917-33C7-2544-B324-DC6EAA3192A2}"/>
               </a:ext>
             </a:extLst>
           </p:cNvPr>
@@ -5446,7 +5462,7 @@
           <p:cNvPr id="22" name="Straight Arrow Connector 21">
             <a:extLst>
               <a:ext uri="{FF2B5EF4-FFF2-40B4-BE49-F238E27FC236}">
-                <a16:creationId xmlns:a16="http://schemas.microsoft.com/office/drawing/2014/main" xmlns="" id="{F00AA7C3-54E4-6F4E-A85C-6A8F4161AAAF}"/>
+                <a16:creationId xmlns:a16="http://schemas.microsoft.com/office/drawing/2014/main" id="{F00AA7C3-54E4-6F4E-A85C-6A8F4161AAAF}"/>
               </a:ext>
             </a:extLst>
           </p:cNvPr>
@@ -5486,7 +5502,7 @@
           <p:cNvPr id="23" name="Straight Arrow Connector 22">
             <a:extLst>
               <a:ext uri="{FF2B5EF4-FFF2-40B4-BE49-F238E27FC236}">
-                <a16:creationId xmlns:a16="http://schemas.microsoft.com/office/drawing/2014/main" xmlns="" id="{CDBB3D06-A42E-474A-BDB4-B2C749190FA5}"/>
+                <a16:creationId xmlns:a16="http://schemas.microsoft.com/office/drawing/2014/main" id="{CDBB3D06-A42E-474A-BDB4-B2C749190FA5}"/>
               </a:ext>
             </a:extLst>
           </p:cNvPr>
@@ -5526,7 +5542,7 @@
           <p:cNvPr id="24" name="Picture 23">
             <a:extLst>
               <a:ext uri="{FF2B5EF4-FFF2-40B4-BE49-F238E27FC236}">
-                <a16:creationId xmlns:a16="http://schemas.microsoft.com/office/drawing/2014/main" xmlns="" id="{823A4F83-8C88-6440-BAC5-B7F24F041B19}"/>
+                <a16:creationId xmlns:a16="http://schemas.microsoft.com/office/drawing/2014/main" id="{823A4F83-8C88-6440-BAC5-B7F24F041B19}"/>
               </a:ext>
             </a:extLst>
           </p:cNvPr>
@@ -5564,7 +5580,7 @@
           <p:cNvPr id="25" name="Straight Arrow Connector 24">
             <a:extLst>
               <a:ext uri="{FF2B5EF4-FFF2-40B4-BE49-F238E27FC236}">
-                <a16:creationId xmlns:a16="http://schemas.microsoft.com/office/drawing/2014/main" xmlns="" id="{9DDFD195-B793-6941-AD06-3777D73C4151}"/>
+                <a16:creationId xmlns:a16="http://schemas.microsoft.com/office/drawing/2014/main" id="{9DDFD195-B793-6941-AD06-3777D73C4151}"/>
               </a:ext>
             </a:extLst>
           </p:cNvPr>
@@ -5607,7 +5623,7 @@
           <p:cNvPr id="26" name="Picture 25">
             <a:extLst>
               <a:ext uri="{FF2B5EF4-FFF2-40B4-BE49-F238E27FC236}">
-                <a16:creationId xmlns:a16="http://schemas.microsoft.com/office/drawing/2014/main" xmlns="" id="{C4ED47DF-3E37-D848-843F-DAC316DD0D79}"/>
+                <a16:creationId xmlns:a16="http://schemas.microsoft.com/office/drawing/2014/main" id="{C4ED47DF-3E37-D848-843F-DAC316DD0D79}"/>
               </a:ext>
             </a:extLst>
           </p:cNvPr>
@@ -5691,7 +5707,7 @@
           <p:cNvPr id="27" name="Picture 26">
             <a:extLst>
               <a:ext uri="{FF2B5EF4-FFF2-40B4-BE49-F238E27FC236}">
-                <a16:creationId xmlns:a16="http://schemas.microsoft.com/office/drawing/2014/main" xmlns="" id="{823A4F83-8C88-6440-BAC5-B7F24F041B19}"/>
+                <a16:creationId xmlns:a16="http://schemas.microsoft.com/office/drawing/2014/main" id="{823A4F83-8C88-6440-BAC5-B7F24F041B19}"/>
               </a:ext>
             </a:extLst>
           </p:cNvPr>
@@ -5729,7 +5745,7 @@
           <p:cNvPr id="29" name="Rectangle 28">
             <a:extLst>
               <a:ext uri="{FF2B5EF4-FFF2-40B4-BE49-F238E27FC236}">
-                <a16:creationId xmlns:a16="http://schemas.microsoft.com/office/drawing/2014/main" xmlns="" id="{A5D26E06-6616-F64B-8DA4-3BF825F83FCC}"/>
+                <a16:creationId xmlns:a16="http://schemas.microsoft.com/office/drawing/2014/main" id="{A5D26E06-6616-F64B-8DA4-3BF825F83FCC}"/>
               </a:ext>
             </a:extLst>
           </p:cNvPr>
@@ -5783,7 +5799,7 @@
           <a:p>
             <a:pPr algn="ctr"/>
             <a:r>
-              <a:rPr lang="en-US" dirty="0" err="1" smtClean="0">
+              <a:rPr lang="en-US" dirty="0" err="1">
                 <a:solidFill>
                   <a:schemeClr val="bg1"/>
                 </a:solidFill>
@@ -5791,18 +5807,13 @@
               <a:t>Auth</a:t>
             </a:r>
             <a:r>
-              <a:rPr lang="en-US" dirty="0" smtClean="0">
+              <a:rPr lang="en-US" dirty="0">
                 <a:solidFill>
                   <a:schemeClr val="bg1"/>
                 </a:solidFill>
               </a:rPr>
               <a:t> API</a:t>
             </a:r>
-            <a:endParaRPr lang="en-US" dirty="0">
-              <a:solidFill>
-                <a:schemeClr val="bg1"/>
-              </a:solidFill>
-            </a:endParaRPr>
           </a:p>
         </p:txBody>
       </p:sp>
@@ -5811,7 +5822,7 @@
           <p:cNvPr id="30" name="Rectangle 29">
             <a:extLst>
               <a:ext uri="{FF2B5EF4-FFF2-40B4-BE49-F238E27FC236}">
-                <a16:creationId xmlns:a16="http://schemas.microsoft.com/office/drawing/2014/main" xmlns="" id="{A5D26E06-6616-F64B-8DA4-3BF825F83FCC}"/>
+                <a16:creationId xmlns:a16="http://schemas.microsoft.com/office/drawing/2014/main" id="{A5D26E06-6616-F64B-8DA4-3BF825F83FCC}"/>
               </a:ext>
             </a:extLst>
           </p:cNvPr>
@@ -5865,18 +5876,13 @@
           <a:p>
             <a:pPr algn="ctr"/>
             <a:r>
-              <a:rPr lang="en-US" dirty="0" smtClean="0">
+              <a:rPr lang="en-US" dirty="0">
                 <a:solidFill>
                   <a:schemeClr val="bg1"/>
                 </a:solidFill>
               </a:rPr>
               <a:t>Express Server</a:t>
             </a:r>
-            <a:endParaRPr lang="en-US" dirty="0">
-              <a:solidFill>
-                <a:schemeClr val="bg1"/>
-              </a:solidFill>
-            </a:endParaRPr>
           </a:p>
         </p:txBody>
       </p:sp>
@@ -5885,7 +5891,7 @@
           <p:cNvPr id="31" name="Straight Arrow Connector 30">
             <a:extLst>
               <a:ext uri="{FF2B5EF4-FFF2-40B4-BE49-F238E27FC236}">
-                <a16:creationId xmlns:a16="http://schemas.microsoft.com/office/drawing/2014/main" xmlns="" id="{DBA13DBE-B9F1-1142-B8F2-74764B9A7870}"/>
+                <a16:creationId xmlns:a16="http://schemas.microsoft.com/office/drawing/2014/main" id="{DBA13DBE-B9F1-1142-B8F2-74764B9A7870}"/>
               </a:ext>
             </a:extLst>
           </p:cNvPr>
@@ -5925,7 +5931,7 @@
           <p:cNvPr id="32" name="Straight Connector 31">
             <a:extLst>
               <a:ext uri="{FF2B5EF4-FFF2-40B4-BE49-F238E27FC236}">
-                <a16:creationId xmlns:a16="http://schemas.microsoft.com/office/drawing/2014/main" xmlns="" id="{A906EB82-8E8B-C645-A295-44A0C50B70CC}"/>
+                <a16:creationId xmlns:a16="http://schemas.microsoft.com/office/drawing/2014/main" id="{A906EB82-8E8B-C645-A295-44A0C50B70CC}"/>
               </a:ext>
             </a:extLst>
           </p:cNvPr>
@@ -5961,7 +5967,7 @@
           <p:cNvPr id="36" name="Straight Arrow Connector 35">
             <a:extLst>
               <a:ext uri="{FF2B5EF4-FFF2-40B4-BE49-F238E27FC236}">
-                <a16:creationId xmlns:a16="http://schemas.microsoft.com/office/drawing/2014/main" xmlns="" id="{CDBB3D06-A42E-474A-BDB4-B2C749190FA5}"/>
+                <a16:creationId xmlns:a16="http://schemas.microsoft.com/office/drawing/2014/main" id="{CDBB3D06-A42E-474A-BDB4-B2C749190FA5}"/>
               </a:ext>
             </a:extLst>
           </p:cNvPr>
@@ -6128,7 +6134,7 @@
           <p:cNvPr id="59" name="Straight Arrow Connector 58">
             <a:extLst>
               <a:ext uri="{FF2B5EF4-FFF2-40B4-BE49-F238E27FC236}">
-                <a16:creationId xmlns:a16="http://schemas.microsoft.com/office/drawing/2014/main" xmlns="" id="{9DDFD195-B793-6941-AD06-3777D73C4151}"/>
+                <a16:creationId xmlns:a16="http://schemas.microsoft.com/office/drawing/2014/main" id="{9DDFD195-B793-6941-AD06-3777D73C4151}"/>
               </a:ext>
             </a:extLst>
           </p:cNvPr>
@@ -6225,7 +6231,7 @@
           <p:cNvPr id="63" name="Picture 62">
             <a:extLst>
               <a:ext uri="{FF2B5EF4-FFF2-40B4-BE49-F238E27FC236}">
-                <a16:creationId xmlns:a16="http://schemas.microsoft.com/office/drawing/2014/main" xmlns="" id="{823A4F83-8C88-6440-BAC5-B7F24F041B19}"/>
+                <a16:creationId xmlns:a16="http://schemas.microsoft.com/office/drawing/2014/main" id="{823A4F83-8C88-6440-BAC5-B7F24F041B19}"/>
               </a:ext>
             </a:extLst>
           </p:cNvPr>
@@ -6263,7 +6269,7 @@
           <p:cNvPr id="64" name="Straight Arrow Connector 63">
             <a:extLst>
               <a:ext uri="{FF2B5EF4-FFF2-40B4-BE49-F238E27FC236}">
-                <a16:creationId xmlns:a16="http://schemas.microsoft.com/office/drawing/2014/main" xmlns="" id="{9DDFD195-B793-6941-AD06-3777D73C4151}"/>
+                <a16:creationId xmlns:a16="http://schemas.microsoft.com/office/drawing/2014/main" id="{9DDFD195-B793-6941-AD06-3777D73C4151}"/>
               </a:ext>
             </a:extLst>
           </p:cNvPr>
@@ -6359,7 +6365,7 @@
           <p:cNvPr id="79" name="Rectangle 78">
             <a:extLst>
               <a:ext uri="{FF2B5EF4-FFF2-40B4-BE49-F238E27FC236}">
-                <a16:creationId xmlns:a16="http://schemas.microsoft.com/office/drawing/2014/main" xmlns="" id="{A5D26E06-6616-F64B-8DA4-3BF825F83FCC}"/>
+                <a16:creationId xmlns:a16="http://schemas.microsoft.com/office/drawing/2014/main" id="{A5D26E06-6616-F64B-8DA4-3BF825F83FCC}"/>
               </a:ext>
             </a:extLst>
           </p:cNvPr>
@@ -6413,26 +6419,13 @@
           <a:p>
             <a:pPr algn="ctr"/>
             <a:r>
-              <a:rPr lang="en-US" dirty="0" smtClean="0">
+              <a:rPr lang="en-US" dirty="0">
                 <a:solidFill>
                   <a:schemeClr val="bg1"/>
                 </a:solidFill>
               </a:rPr>
-              <a:t>Store</a:t>
-            </a:r>
-            <a:r>
-              <a:rPr lang="en-US" dirty="0" smtClean="0">
-                <a:solidFill>
-                  <a:schemeClr val="bg1"/>
-                </a:solidFill>
-              </a:rPr>
-              <a:t> API</a:t>
-            </a:r>
-            <a:endParaRPr lang="en-US" dirty="0">
-              <a:solidFill>
-                <a:schemeClr val="bg1"/>
-              </a:solidFill>
-            </a:endParaRPr>
+              <a:t>Store API</a:t>
+            </a:r>
           </a:p>
         </p:txBody>
       </p:sp>
@@ -6441,7 +6434,7 @@
           <p:cNvPr id="80" name="Rectangle 79">
             <a:extLst>
               <a:ext uri="{FF2B5EF4-FFF2-40B4-BE49-F238E27FC236}">
-                <a16:creationId xmlns:a16="http://schemas.microsoft.com/office/drawing/2014/main" xmlns="" id="{A5D26E06-6616-F64B-8DA4-3BF825F83FCC}"/>
+                <a16:creationId xmlns:a16="http://schemas.microsoft.com/office/drawing/2014/main" id="{A5D26E06-6616-F64B-8DA4-3BF825F83FCC}"/>
               </a:ext>
             </a:extLst>
           </p:cNvPr>
@@ -6495,18 +6488,13 @@
           <a:p>
             <a:pPr algn="ctr"/>
             <a:r>
-              <a:rPr lang="en-US" dirty="0" smtClean="0">
+              <a:rPr lang="en-US" dirty="0">
                 <a:solidFill>
                   <a:schemeClr val="bg1"/>
                 </a:solidFill>
               </a:rPr>
               <a:t>Google Cloud Function</a:t>
             </a:r>
-            <a:endParaRPr lang="en-US" dirty="0">
-              <a:solidFill>
-                <a:schemeClr val="bg1"/>
-              </a:solidFill>
-            </a:endParaRPr>
           </a:p>
         </p:txBody>
       </p:sp>
@@ -6515,7 +6503,7 @@
           <p:cNvPr id="81" name="Straight Connector 80">
             <a:extLst>
               <a:ext uri="{FF2B5EF4-FFF2-40B4-BE49-F238E27FC236}">
-                <a16:creationId xmlns:a16="http://schemas.microsoft.com/office/drawing/2014/main" xmlns="" id="{A906EB82-8E8B-C645-A295-44A0C50B70CC}"/>
+                <a16:creationId xmlns:a16="http://schemas.microsoft.com/office/drawing/2014/main" id="{A906EB82-8E8B-C645-A295-44A0C50B70CC}"/>
               </a:ext>
             </a:extLst>
           </p:cNvPr>
@@ -6551,7 +6539,7 @@
           <p:cNvPr id="83" name="Straight Arrow Connector 82">
             <a:extLst>
               <a:ext uri="{FF2B5EF4-FFF2-40B4-BE49-F238E27FC236}">
-                <a16:creationId xmlns:a16="http://schemas.microsoft.com/office/drawing/2014/main" xmlns="" id="{DBA13DBE-B9F1-1142-B8F2-74764B9A7870}"/>
+                <a16:creationId xmlns:a16="http://schemas.microsoft.com/office/drawing/2014/main" id="{DBA13DBE-B9F1-1142-B8F2-74764B9A7870}"/>
               </a:ext>
             </a:extLst>
           </p:cNvPr>
@@ -6591,7 +6579,7 @@
           <p:cNvPr id="84" name="Straight Arrow Connector 83">
             <a:extLst>
               <a:ext uri="{FF2B5EF4-FFF2-40B4-BE49-F238E27FC236}">
-                <a16:creationId xmlns:a16="http://schemas.microsoft.com/office/drawing/2014/main" xmlns="" id="{CDBB3D06-A42E-474A-BDB4-B2C749190FA5}"/>
+                <a16:creationId xmlns:a16="http://schemas.microsoft.com/office/drawing/2014/main" id="{CDBB3D06-A42E-474A-BDB4-B2C749190FA5}"/>
               </a:ext>
             </a:extLst>
           </p:cNvPr>
@@ -6631,7 +6619,7 @@
           <p:cNvPr id="87" name="Straight Arrow Connector 86">
             <a:extLst>
               <a:ext uri="{FF2B5EF4-FFF2-40B4-BE49-F238E27FC236}">
-                <a16:creationId xmlns:a16="http://schemas.microsoft.com/office/drawing/2014/main" xmlns="" id="{DBA13DBE-B9F1-1142-B8F2-74764B9A7870}"/>
+                <a16:creationId xmlns:a16="http://schemas.microsoft.com/office/drawing/2014/main" id="{DBA13DBE-B9F1-1142-B8F2-74764B9A7870}"/>
               </a:ext>
             </a:extLst>
           </p:cNvPr>
@@ -6671,7 +6659,7 @@
           <p:cNvPr id="88" name="Straight Arrow Connector 87">
             <a:extLst>
               <a:ext uri="{FF2B5EF4-FFF2-40B4-BE49-F238E27FC236}">
-                <a16:creationId xmlns:a16="http://schemas.microsoft.com/office/drawing/2014/main" xmlns="" id="{CDBB3D06-A42E-474A-BDB4-B2C749190FA5}"/>
+                <a16:creationId xmlns:a16="http://schemas.microsoft.com/office/drawing/2014/main" id="{CDBB3D06-A42E-474A-BDB4-B2C749190FA5}"/>
               </a:ext>
             </a:extLst>
           </p:cNvPr>
@@ -6711,7 +6699,7 @@
           <p:cNvPr id="89" name="Rectangle 88">
             <a:extLst>
               <a:ext uri="{FF2B5EF4-FFF2-40B4-BE49-F238E27FC236}">
-                <a16:creationId xmlns:a16="http://schemas.microsoft.com/office/drawing/2014/main" xmlns="" id="{A5D26E06-6616-F64B-8DA4-3BF825F83FCC}"/>
+                <a16:creationId xmlns:a16="http://schemas.microsoft.com/office/drawing/2014/main" id="{A5D26E06-6616-F64B-8DA4-3BF825F83FCC}"/>
               </a:ext>
             </a:extLst>
           </p:cNvPr>
@@ -6765,18 +6753,13 @@
           <a:p>
             <a:pPr algn="ctr"/>
             <a:r>
-              <a:rPr lang="en-US" dirty="0" smtClean="0">
+              <a:rPr lang="en-US" dirty="0">
                 <a:solidFill>
                   <a:schemeClr val="bg1"/>
                 </a:solidFill>
               </a:rPr>
               <a:t>Google Places API</a:t>
             </a:r>
-            <a:endParaRPr lang="en-US" dirty="0">
-              <a:solidFill>
-                <a:schemeClr val="bg1"/>
-              </a:solidFill>
-            </a:endParaRPr>
           </a:p>
         </p:txBody>
       </p:sp>
@@ -6815,7 +6798,7 @@
           <p:cNvPr id="4" name="Picture 3">
             <a:extLst>
               <a:ext uri="{FF2B5EF4-FFF2-40B4-BE49-F238E27FC236}">
-                <a16:creationId xmlns:a16="http://schemas.microsoft.com/office/drawing/2014/main" xmlns="" id="{A7167422-60CB-4441-B184-4D6749DE88F2}"/>
+                <a16:creationId xmlns:a16="http://schemas.microsoft.com/office/drawing/2014/main" id="{A7167422-60CB-4441-B184-4D6749DE88F2}"/>
               </a:ext>
             </a:extLst>
           </p:cNvPr>
@@ -6845,7 +6828,7 @@
           <p:cNvPr id="5" name="Straight Arrow Connector 4">
             <a:extLst>
               <a:ext uri="{FF2B5EF4-FFF2-40B4-BE49-F238E27FC236}">
-                <a16:creationId xmlns:a16="http://schemas.microsoft.com/office/drawing/2014/main" xmlns="" id="{9DDFD195-B793-6941-AD06-3777D73C4151}"/>
+                <a16:creationId xmlns:a16="http://schemas.microsoft.com/office/drawing/2014/main" id="{9DDFD195-B793-6941-AD06-3777D73C4151}"/>
               </a:ext>
             </a:extLst>
           </p:cNvPr>
@@ -6888,7 +6871,7 @@
           <p:cNvPr id="8" name="Picture 7">
             <a:extLst>
               <a:ext uri="{FF2B5EF4-FFF2-40B4-BE49-F238E27FC236}">
-                <a16:creationId xmlns:a16="http://schemas.microsoft.com/office/drawing/2014/main" xmlns="" id="{823A4F83-8C88-6440-BAC5-B7F24F041B19}"/>
+                <a16:creationId xmlns:a16="http://schemas.microsoft.com/office/drawing/2014/main" id="{823A4F83-8C88-6440-BAC5-B7F24F041B19}"/>
               </a:ext>
             </a:extLst>
           </p:cNvPr>
@@ -6926,7 +6909,7 @@
           <p:cNvPr id="10" name="Straight Arrow Connector 9">
             <a:extLst>
               <a:ext uri="{FF2B5EF4-FFF2-40B4-BE49-F238E27FC236}">
-                <a16:creationId xmlns:a16="http://schemas.microsoft.com/office/drawing/2014/main" xmlns="" id="{9DDFD195-B793-6941-AD06-3777D73C4151}"/>
+                <a16:creationId xmlns:a16="http://schemas.microsoft.com/office/drawing/2014/main" id="{9DDFD195-B793-6941-AD06-3777D73C4151}"/>
               </a:ext>
             </a:extLst>
           </p:cNvPr>
@@ -7247,7 +7230,7 @@
           <p:cNvPr id="20" name="Straight Arrow Connector 19">
             <a:extLst>
               <a:ext uri="{FF2B5EF4-FFF2-40B4-BE49-F238E27FC236}">
-                <a16:creationId xmlns:a16="http://schemas.microsoft.com/office/drawing/2014/main" xmlns="" id="{9DDFD195-B793-6941-AD06-3777D73C4151}"/>
+                <a16:creationId xmlns:a16="http://schemas.microsoft.com/office/drawing/2014/main" id="{9DDFD195-B793-6941-AD06-3777D73C4151}"/>
               </a:ext>
             </a:extLst>
           </p:cNvPr>
@@ -7291,7 +7274,7 @@
           <p:cNvPr id="23" name="Straight Arrow Connector 22">
             <a:extLst>
               <a:ext uri="{FF2B5EF4-FFF2-40B4-BE49-F238E27FC236}">
-                <a16:creationId xmlns:a16="http://schemas.microsoft.com/office/drawing/2014/main" xmlns="" id="{9DDFD195-B793-6941-AD06-3777D73C4151}"/>
+                <a16:creationId xmlns:a16="http://schemas.microsoft.com/office/drawing/2014/main" id="{9DDFD195-B793-6941-AD06-3777D73C4151}"/>
               </a:ext>
             </a:extLst>
           </p:cNvPr>
@@ -7335,7 +7318,7 @@
           <p:cNvPr id="27" name="Straight Arrow Connector 26">
             <a:extLst>
               <a:ext uri="{FF2B5EF4-FFF2-40B4-BE49-F238E27FC236}">
-                <a16:creationId xmlns:a16="http://schemas.microsoft.com/office/drawing/2014/main" xmlns="" id="{9DDFD195-B793-6941-AD06-3777D73C4151}"/>
+                <a16:creationId xmlns:a16="http://schemas.microsoft.com/office/drawing/2014/main" id="{9DDFD195-B793-6941-AD06-3777D73C4151}"/>
               </a:ext>
             </a:extLst>
           </p:cNvPr>
@@ -7379,7 +7362,7 @@
           <p:cNvPr id="31" name="Straight Arrow Connector 30">
             <a:extLst>
               <a:ext uri="{FF2B5EF4-FFF2-40B4-BE49-F238E27FC236}">
-                <a16:creationId xmlns:a16="http://schemas.microsoft.com/office/drawing/2014/main" xmlns="" id="{9DDFD195-B793-6941-AD06-3777D73C4151}"/>
+                <a16:creationId xmlns:a16="http://schemas.microsoft.com/office/drawing/2014/main" id="{9DDFD195-B793-6941-AD06-3777D73C4151}"/>
               </a:ext>
             </a:extLst>
           </p:cNvPr>
@@ -7423,7 +7406,7 @@
           <p:cNvPr id="37" name="Straight Arrow Connector 36">
             <a:extLst>
               <a:ext uri="{FF2B5EF4-FFF2-40B4-BE49-F238E27FC236}">
-                <a16:creationId xmlns:a16="http://schemas.microsoft.com/office/drawing/2014/main" xmlns="" id="{9DDFD195-B793-6941-AD06-3777D73C4151}"/>
+                <a16:creationId xmlns:a16="http://schemas.microsoft.com/office/drawing/2014/main" id="{9DDFD195-B793-6941-AD06-3777D73C4151}"/>
               </a:ext>
             </a:extLst>
           </p:cNvPr>
@@ -7465,7 +7448,7 @@
           <p:cNvPr id="40" name="Straight Arrow Connector 39">
             <a:extLst>
               <a:ext uri="{FF2B5EF4-FFF2-40B4-BE49-F238E27FC236}">
-                <a16:creationId xmlns:a16="http://schemas.microsoft.com/office/drawing/2014/main" xmlns="" id="{9DDFD195-B793-6941-AD06-3777D73C4151}"/>
+                <a16:creationId xmlns:a16="http://schemas.microsoft.com/office/drawing/2014/main" id="{9DDFD195-B793-6941-AD06-3777D73C4151}"/>
               </a:ext>
             </a:extLst>
           </p:cNvPr>
@@ -7507,7 +7490,7 @@
           <p:cNvPr id="45" name="Straight Arrow Connector 44">
             <a:extLst>
               <a:ext uri="{FF2B5EF4-FFF2-40B4-BE49-F238E27FC236}">
-                <a16:creationId xmlns:a16="http://schemas.microsoft.com/office/drawing/2014/main" xmlns="" id="{9DDFD195-B793-6941-AD06-3777D73C4151}"/>
+                <a16:creationId xmlns:a16="http://schemas.microsoft.com/office/drawing/2014/main" id="{9DDFD195-B793-6941-AD06-3777D73C4151}"/>
               </a:ext>
             </a:extLst>
           </p:cNvPr>
@@ -7550,7 +7533,7 @@
           <p:cNvPr id="51" name="Straight Arrow Connector 50">
             <a:extLst>
               <a:ext uri="{FF2B5EF4-FFF2-40B4-BE49-F238E27FC236}">
-                <a16:creationId xmlns:a16="http://schemas.microsoft.com/office/drawing/2014/main" xmlns="" id="{9DDFD195-B793-6941-AD06-3777D73C4151}"/>
+                <a16:creationId xmlns:a16="http://schemas.microsoft.com/office/drawing/2014/main" id="{9DDFD195-B793-6941-AD06-3777D73C4151}"/>
               </a:ext>
             </a:extLst>
           </p:cNvPr>
@@ -7592,7 +7575,7 @@
           <p:cNvPr id="52" name="Straight Arrow Connector 51">
             <a:extLst>
               <a:ext uri="{FF2B5EF4-FFF2-40B4-BE49-F238E27FC236}">
-                <a16:creationId xmlns:a16="http://schemas.microsoft.com/office/drawing/2014/main" xmlns="" id="{9DDFD195-B793-6941-AD06-3777D73C4151}"/>
+                <a16:creationId xmlns:a16="http://schemas.microsoft.com/office/drawing/2014/main" id="{9DDFD195-B793-6941-AD06-3777D73C4151}"/>
               </a:ext>
             </a:extLst>
           </p:cNvPr>
@@ -7634,7 +7617,7 @@
           <p:cNvPr id="56" name="Straight Arrow Connector 55">
             <a:extLst>
               <a:ext uri="{FF2B5EF4-FFF2-40B4-BE49-F238E27FC236}">
-                <a16:creationId xmlns:a16="http://schemas.microsoft.com/office/drawing/2014/main" xmlns="" id="{9DDFD195-B793-6941-AD06-3777D73C4151}"/>
+                <a16:creationId xmlns:a16="http://schemas.microsoft.com/office/drawing/2014/main" id="{9DDFD195-B793-6941-AD06-3777D73C4151}"/>
               </a:ext>
             </a:extLst>
           </p:cNvPr>
@@ -7838,7 +7821,7 @@
           <p:cNvPr id="63" name="Rectangle 62">
             <a:extLst>
               <a:ext uri="{FF2B5EF4-FFF2-40B4-BE49-F238E27FC236}">
-                <a16:creationId xmlns:a16="http://schemas.microsoft.com/office/drawing/2014/main" xmlns="" id="{A5D26E06-6616-F64B-8DA4-3BF825F83FCC}"/>
+                <a16:creationId xmlns:a16="http://schemas.microsoft.com/office/drawing/2014/main" id="{A5D26E06-6616-F64B-8DA4-3BF825F83FCC}"/>
               </a:ext>
             </a:extLst>
           </p:cNvPr>
@@ -7892,7 +7875,7 @@
           <a:p>
             <a:pPr algn="ctr"/>
             <a:r>
-              <a:rPr lang="en-US" dirty="0" err="1" smtClean="0">
+              <a:rPr lang="en-US" dirty="0" err="1">
                 <a:solidFill>
                   <a:schemeClr val="bg1"/>
                 </a:solidFill>
@@ -7900,18 +7883,13 @@
               <a:t>Auth</a:t>
             </a:r>
             <a:r>
-              <a:rPr lang="en-US" dirty="0" smtClean="0">
+              <a:rPr lang="en-US" dirty="0">
                 <a:solidFill>
                   <a:schemeClr val="bg1"/>
                 </a:solidFill>
               </a:rPr>
               <a:t> API</a:t>
             </a:r>
-            <a:endParaRPr lang="en-US" dirty="0">
-              <a:solidFill>
-                <a:schemeClr val="bg1"/>
-              </a:solidFill>
-            </a:endParaRPr>
           </a:p>
         </p:txBody>
       </p:sp>
@@ -7920,7 +7898,7 @@
           <p:cNvPr id="64" name="Rectangle 63">
             <a:extLst>
               <a:ext uri="{FF2B5EF4-FFF2-40B4-BE49-F238E27FC236}">
-                <a16:creationId xmlns:a16="http://schemas.microsoft.com/office/drawing/2014/main" xmlns="" id="{A5D26E06-6616-F64B-8DA4-3BF825F83FCC}"/>
+                <a16:creationId xmlns:a16="http://schemas.microsoft.com/office/drawing/2014/main" id="{A5D26E06-6616-F64B-8DA4-3BF825F83FCC}"/>
               </a:ext>
             </a:extLst>
           </p:cNvPr>
@@ -7974,18 +7952,13 @@
           <a:p>
             <a:pPr algn="ctr"/>
             <a:r>
-              <a:rPr lang="en-US" dirty="0" smtClean="0">
+              <a:rPr lang="en-US" dirty="0">
                 <a:solidFill>
                   <a:schemeClr val="bg1"/>
                 </a:solidFill>
               </a:rPr>
               <a:t>Card API</a:t>
             </a:r>
-            <a:endParaRPr lang="en-US" dirty="0">
-              <a:solidFill>
-                <a:schemeClr val="bg1"/>
-              </a:solidFill>
-            </a:endParaRPr>
           </a:p>
         </p:txBody>
       </p:sp>
@@ -7994,7 +7967,7 @@
           <p:cNvPr id="65" name="Rectangle 64">
             <a:extLst>
               <a:ext uri="{FF2B5EF4-FFF2-40B4-BE49-F238E27FC236}">
-                <a16:creationId xmlns:a16="http://schemas.microsoft.com/office/drawing/2014/main" xmlns="" id="{A5D26E06-6616-F64B-8DA4-3BF825F83FCC}"/>
+                <a16:creationId xmlns:a16="http://schemas.microsoft.com/office/drawing/2014/main" id="{A5D26E06-6616-F64B-8DA4-3BF825F83FCC}"/>
               </a:ext>
             </a:extLst>
           </p:cNvPr>
@@ -8048,18 +8021,13 @@
           <a:p>
             <a:pPr algn="ctr"/>
             <a:r>
-              <a:rPr lang="en-US" dirty="0" smtClean="0">
+              <a:rPr lang="en-US" dirty="0">
                 <a:solidFill>
                   <a:schemeClr val="bg1"/>
                 </a:solidFill>
               </a:rPr>
               <a:t>Payment API</a:t>
             </a:r>
-            <a:endParaRPr lang="en-US" dirty="0">
-              <a:solidFill>
-                <a:schemeClr val="bg1"/>
-              </a:solidFill>
-            </a:endParaRPr>
           </a:p>
         </p:txBody>
       </p:sp>
@@ -8068,7 +8036,7 @@
           <p:cNvPr id="66" name="Rectangle 65">
             <a:extLst>
               <a:ext uri="{FF2B5EF4-FFF2-40B4-BE49-F238E27FC236}">
-                <a16:creationId xmlns:a16="http://schemas.microsoft.com/office/drawing/2014/main" xmlns="" id="{A5D26E06-6616-F64B-8DA4-3BF825F83FCC}"/>
+                <a16:creationId xmlns:a16="http://schemas.microsoft.com/office/drawing/2014/main" id="{A5D26E06-6616-F64B-8DA4-3BF825F83FCC}"/>
               </a:ext>
             </a:extLst>
           </p:cNvPr>
@@ -8122,18 +8090,13 @@
           <a:p>
             <a:pPr algn="ctr"/>
             <a:r>
-              <a:rPr lang="en-US" dirty="0" smtClean="0">
+              <a:rPr lang="en-US" dirty="0">
                 <a:solidFill>
                   <a:schemeClr val="bg1"/>
                 </a:solidFill>
               </a:rPr>
               <a:t>Web3 Interface</a:t>
             </a:r>
-            <a:endParaRPr lang="en-US" dirty="0">
-              <a:solidFill>
-                <a:schemeClr val="bg1"/>
-              </a:solidFill>
-            </a:endParaRPr>
           </a:p>
         </p:txBody>
       </p:sp>
@@ -8439,7 +8402,7 @@
   <a:extraClrSchemeLst/>
   <a:extLst>
     <a:ext uri="{05A4C25C-085E-4340-85A3-A5531E510DB2}">
-      <thm15:themeFamily xmlns:thm15="http://schemas.microsoft.com/office/thememl/2012/main" xmlns="" name="Office Theme" id="{62F939B6-93AF-4DB8-9C6B-D6C7DFDC589F}" vid="{4A3C46E8-61CC-4603-A589-7422A47A8E4A}"/>
+      <thm15:themeFamily xmlns:thm15="http://schemas.microsoft.com/office/thememl/2012/main" name="Office Theme" id="{62F939B6-93AF-4DB8-9C6B-D6C7DFDC589F}" vid="{4A3C46E8-61CC-4603-A589-7422A47A8E4A}"/>
     </a:ext>
   </a:extLst>
 </a:theme>

</xml_diff>